<commit_message>
finished fixing plots and making PCAs
</commit_message>
<xml_diff>
--- a/DEBIAS-M/data/DEBIAS-M results.pptx
+++ b/DEBIAS-M/data/DEBIAS-M results.pptx
@@ -109,6 +109,11 @@
       </a:defRPr>
     </a:lvl9pPr>
   </p:defaultTextStyle>
+  <p:extLst>
+    <p:ext uri="{EFAFB233-063F-42B5-8137-9DF3F51BA10A}">
+      <p15:sldGuideLst xmlns:p15="http://schemas.microsoft.com/office/powerpoint/2012/main"/>
+    </p:ext>
+  </p:extLst>
 </p:presentation>
 </file>
 
@@ -259,7 +264,7 @@
           <a:p>
             <a:fld id="{DFC1CEA9-16E4-416C-8373-277C90513E6F}" type="datetimeFigureOut">
               <a:rPr lang="en-US" smtClean="0"/>
-              <a:t>7/26/2024</a:t>
+              <a:t>7/27/2024</a:t>
             </a:fld>
             <a:endParaRPr lang="en-US"/>
           </a:p>
@@ -457,7 +462,7 @@
           <a:p>
             <a:fld id="{DFC1CEA9-16E4-416C-8373-277C90513E6F}" type="datetimeFigureOut">
               <a:rPr lang="en-US" smtClean="0"/>
-              <a:t>7/26/2024</a:t>
+              <a:t>7/27/2024</a:t>
             </a:fld>
             <a:endParaRPr lang="en-US"/>
           </a:p>
@@ -665,7 +670,7 @@
           <a:p>
             <a:fld id="{DFC1CEA9-16E4-416C-8373-277C90513E6F}" type="datetimeFigureOut">
               <a:rPr lang="en-US" smtClean="0"/>
-              <a:t>7/26/2024</a:t>
+              <a:t>7/27/2024</a:t>
             </a:fld>
             <a:endParaRPr lang="en-US"/>
           </a:p>
@@ -863,7 +868,7 @@
           <a:p>
             <a:fld id="{DFC1CEA9-16E4-416C-8373-277C90513E6F}" type="datetimeFigureOut">
               <a:rPr lang="en-US" smtClean="0"/>
-              <a:t>7/26/2024</a:t>
+              <a:t>7/27/2024</a:t>
             </a:fld>
             <a:endParaRPr lang="en-US"/>
           </a:p>
@@ -1138,7 +1143,7 @@
           <a:p>
             <a:fld id="{DFC1CEA9-16E4-416C-8373-277C90513E6F}" type="datetimeFigureOut">
               <a:rPr lang="en-US" smtClean="0"/>
-              <a:t>7/26/2024</a:t>
+              <a:t>7/27/2024</a:t>
             </a:fld>
             <a:endParaRPr lang="en-US"/>
           </a:p>
@@ -1403,7 +1408,7 @@
           <a:p>
             <a:fld id="{DFC1CEA9-16E4-416C-8373-277C90513E6F}" type="datetimeFigureOut">
               <a:rPr lang="en-US" smtClean="0"/>
-              <a:t>7/26/2024</a:t>
+              <a:t>7/27/2024</a:t>
             </a:fld>
             <a:endParaRPr lang="en-US"/>
           </a:p>
@@ -1815,7 +1820,7 @@
           <a:p>
             <a:fld id="{DFC1CEA9-16E4-416C-8373-277C90513E6F}" type="datetimeFigureOut">
               <a:rPr lang="en-US" smtClean="0"/>
-              <a:t>7/26/2024</a:t>
+              <a:t>7/27/2024</a:t>
             </a:fld>
             <a:endParaRPr lang="en-US"/>
           </a:p>
@@ -1956,7 +1961,7 @@
           <a:p>
             <a:fld id="{DFC1CEA9-16E4-416C-8373-277C90513E6F}" type="datetimeFigureOut">
               <a:rPr lang="en-US" smtClean="0"/>
-              <a:t>7/26/2024</a:t>
+              <a:t>7/27/2024</a:t>
             </a:fld>
             <a:endParaRPr lang="en-US"/>
           </a:p>
@@ -2069,7 +2074,7 @@
           <a:p>
             <a:fld id="{DFC1CEA9-16E4-416C-8373-277C90513E6F}" type="datetimeFigureOut">
               <a:rPr lang="en-US" smtClean="0"/>
-              <a:t>7/26/2024</a:t>
+              <a:t>7/27/2024</a:t>
             </a:fld>
             <a:endParaRPr lang="en-US"/>
           </a:p>
@@ -2380,7 +2385,7 @@
           <a:p>
             <a:fld id="{DFC1CEA9-16E4-416C-8373-277C90513E6F}" type="datetimeFigureOut">
               <a:rPr lang="en-US" smtClean="0"/>
-              <a:t>7/26/2024</a:t>
+              <a:t>7/27/2024</a:t>
             </a:fld>
             <a:endParaRPr lang="en-US"/>
           </a:p>
@@ -2668,7 +2673,7 @@
           <a:p>
             <a:fld id="{DFC1CEA9-16E4-416C-8373-277C90513E6F}" type="datetimeFigureOut">
               <a:rPr lang="en-US" smtClean="0"/>
-              <a:t>7/26/2024</a:t>
+              <a:t>7/27/2024</a:t>
             </a:fld>
             <a:endParaRPr lang="en-US"/>
           </a:p>
@@ -2909,7 +2914,7 @@
           <a:p>
             <a:fld id="{DFC1CEA9-16E4-416C-8373-277C90513E6F}" type="datetimeFigureOut">
               <a:rPr lang="en-US" smtClean="0"/>
-              <a:t>7/26/2024</a:t>
+              <a:t>7/27/2024</a:t>
             </a:fld>
             <a:endParaRPr lang="en-US"/>
           </a:p>
@@ -3584,6 +3589,42 @@
           </a:xfrm>
         </p:spPr>
       </p:pic>
+      <p:pic>
+        <p:nvPicPr>
+          <p:cNvPr id="4" name="Picture 3" descr="A screenshot of a graph&#10;&#10;Description automatically generated">
+            <a:extLst>
+              <a:ext uri="{FF2B5EF4-FFF2-40B4-BE49-F238E27FC236}">
+                <a16:creationId xmlns:a16="http://schemas.microsoft.com/office/drawing/2014/main" id="{8AD3A0C2-0286-4E56-B96D-B8F29EEBE299}"/>
+              </a:ext>
+            </a:extLst>
+          </p:cNvPr>
+          <p:cNvPicPr>
+            <a:picLocks noChangeAspect="1"/>
+          </p:cNvPicPr>
+          <p:nvPr/>
+        </p:nvPicPr>
+        <p:blipFill>
+          <a:blip r:embed="rId3">
+            <a:extLst>
+              <a:ext uri="{28A0092B-C50C-407E-A947-70E740481C1C}">
+                <a14:useLocalDpi xmlns:a14="http://schemas.microsoft.com/office/drawing/2010/main" val="0"/>
+              </a:ext>
+            </a:extLst>
+          </a:blip>
+          <a:stretch>
+            <a:fillRect/>
+          </a:stretch>
+        </p:blipFill>
+        <p:spPr>
+          <a:xfrm>
+            <a:off x="1563356" y="1690688"/>
+            <a:ext cx="9525000" cy="4572000"/>
+          </a:xfrm>
+          <a:prstGeom prst="rect">
+            <a:avLst/>
+          </a:prstGeom>
+        </p:spPr>
+      </p:pic>
     </p:spTree>
     <p:extLst>
       <p:ext uri="{BB962C8B-B14F-4D97-AF65-F5344CB8AC3E}">
@@ -3687,9 +3728,45 @@
         </p:blipFill>
         <p:spPr>
           <a:xfrm>
-            <a:off x="4783014" y="365125"/>
+            <a:off x="4733587" y="506165"/>
             <a:ext cx="6191660" cy="6191660"/>
           </a:xfrm>
+        </p:spPr>
+      </p:pic>
+      <p:pic>
+        <p:nvPicPr>
+          <p:cNvPr id="4" name="Picture 3" descr="A graph with many colored dots&#10;&#10;Description automatically generated">
+            <a:extLst>
+              <a:ext uri="{FF2B5EF4-FFF2-40B4-BE49-F238E27FC236}">
+                <a16:creationId xmlns:a16="http://schemas.microsoft.com/office/drawing/2014/main" id="{F6ED8161-5E60-518F-63B9-4D61623D4DC3}"/>
+              </a:ext>
+            </a:extLst>
+          </p:cNvPr>
+          <p:cNvPicPr>
+            <a:picLocks noChangeAspect="1"/>
+          </p:cNvPicPr>
+          <p:nvPr/>
+        </p:nvPicPr>
+        <p:blipFill>
+          <a:blip r:embed="rId3">
+            <a:extLst>
+              <a:ext uri="{28A0092B-C50C-407E-A947-70E740481C1C}">
+                <a14:useLocalDpi xmlns:a14="http://schemas.microsoft.com/office/drawing/2010/main" val="0"/>
+              </a:ext>
+            </a:extLst>
+          </a:blip>
+          <a:stretch>
+            <a:fillRect/>
+          </a:stretch>
+        </p:blipFill>
+        <p:spPr>
+          <a:xfrm>
+            <a:off x="4733587" y="506165"/>
+            <a:ext cx="6191660" cy="6191660"/>
+          </a:xfrm>
+          <a:prstGeom prst="rect">
+            <a:avLst/>
+          </a:prstGeom>
         </p:spPr>
       </p:pic>
     </p:spTree>
@@ -3800,6 +3877,78 @@
           </a:xfrm>
         </p:spPr>
       </p:pic>
+      <p:pic>
+        <p:nvPicPr>
+          <p:cNvPr id="4" name="Picture 3" descr="A graph of a number of colorful dots&#10;&#10;Description automatically generated with medium confidence">
+            <a:extLst>
+              <a:ext uri="{FF2B5EF4-FFF2-40B4-BE49-F238E27FC236}">
+                <a16:creationId xmlns:a16="http://schemas.microsoft.com/office/drawing/2014/main" id="{6C780F81-72DF-0602-623A-A0BD410C20BE}"/>
+              </a:ext>
+            </a:extLst>
+          </p:cNvPr>
+          <p:cNvPicPr>
+            <a:picLocks noChangeAspect="1"/>
+          </p:cNvPicPr>
+          <p:nvPr/>
+        </p:nvPicPr>
+        <p:blipFill>
+          <a:blip r:embed="rId3">
+            <a:extLst>
+              <a:ext uri="{28A0092B-C50C-407E-A947-70E740481C1C}">
+                <a14:useLocalDpi xmlns:a14="http://schemas.microsoft.com/office/drawing/2010/main" val="0"/>
+              </a:ext>
+            </a:extLst>
+          </a:blip>
+          <a:stretch>
+            <a:fillRect/>
+          </a:stretch>
+        </p:blipFill>
+        <p:spPr>
+          <a:xfrm>
+            <a:off x="5216568" y="515580"/>
+            <a:ext cx="6036318" cy="6036318"/>
+          </a:xfrm>
+          <a:prstGeom prst="rect">
+            <a:avLst/>
+          </a:prstGeom>
+        </p:spPr>
+      </p:pic>
+      <p:pic>
+        <p:nvPicPr>
+          <p:cNvPr id="6" name="Picture 5" descr="A graph of a number of colorful dots&#10;&#10;Description automatically generated with medium confidence">
+            <a:extLst>
+              <a:ext uri="{FF2B5EF4-FFF2-40B4-BE49-F238E27FC236}">
+                <a16:creationId xmlns:a16="http://schemas.microsoft.com/office/drawing/2014/main" id="{5259D6C7-07E3-CBEC-8CAF-BB75D982699A}"/>
+              </a:ext>
+            </a:extLst>
+          </p:cNvPr>
+          <p:cNvPicPr>
+            <a:picLocks noChangeAspect="1"/>
+          </p:cNvPicPr>
+          <p:nvPr/>
+        </p:nvPicPr>
+        <p:blipFill>
+          <a:blip r:embed="rId3">
+            <a:extLst>
+              <a:ext uri="{28A0092B-C50C-407E-A947-70E740481C1C}">
+                <a14:useLocalDpi xmlns:a14="http://schemas.microsoft.com/office/drawing/2010/main" val="0"/>
+              </a:ext>
+            </a:extLst>
+          </a:blip>
+          <a:stretch>
+            <a:fillRect/>
+          </a:stretch>
+        </p:blipFill>
+        <p:spPr>
+          <a:xfrm>
+            <a:off x="5216567" y="515579"/>
+            <a:ext cx="6036317" cy="6036317"/>
+          </a:xfrm>
+          <a:prstGeom prst="rect">
+            <a:avLst/>
+          </a:prstGeom>
+        </p:spPr>
+      </p:pic>
     </p:spTree>
     <p:extLst>
       <p:ext uri="{BB962C8B-B14F-4D97-AF65-F5344CB8AC3E}">
@@ -3875,10 +4024,10 @@
       </p:sp>
       <p:pic>
         <p:nvPicPr>
-          <p:cNvPr id="5" name="Content Placeholder 4" descr="A graph with many colored dots&#10;&#10;Description automatically generated">
-            <a:extLst>
-              <a:ext uri="{FF2B5EF4-FFF2-40B4-BE49-F238E27FC236}">
-                <a16:creationId xmlns:a16="http://schemas.microsoft.com/office/drawing/2014/main" id="{53B96A23-869A-7696-ECF4-09E8F49BAB76}"/>
+          <p:cNvPr id="7" name="Content Placeholder 6" descr="A graph with numbers and symbols&#10;&#10;Description automatically generated with medium confidence">
+            <a:extLst>
+              <a:ext uri="{FF2B5EF4-FFF2-40B4-BE49-F238E27FC236}">
+                <a16:creationId xmlns:a16="http://schemas.microsoft.com/office/drawing/2014/main" id="{4981EBC7-67AC-D02A-47AF-50EB3ECCE34F}"/>
               </a:ext>
             </a:extLst>
           </p:cNvPr>
@@ -3903,8 +4052,8 @@
         </p:blipFill>
         <p:spPr>
           <a:xfrm>
-            <a:off x="4783014" y="365125"/>
-            <a:ext cx="6191660" cy="6191660"/>
+            <a:off x="4909544" y="347496"/>
+            <a:ext cx="6163007" cy="6163007"/>
           </a:xfrm>
         </p:spPr>
       </p:pic>

</xml_diff>

<commit_message>
started running the semi-leaky DEBIAS
</commit_message>
<xml_diff>
--- a/DEBIAS-M/data/DEBIAS-M results.pptx
+++ b/DEBIAS-M/data/DEBIAS-M results.pptx
@@ -4,9 +4,12 @@
   <p:sldMasterIdLst>
     <p:sldMasterId id="2147483648" r:id="rId1"/>
   </p:sldMasterIdLst>
+  <p:notesMasterIdLst>
+    <p:notesMasterId r:id="rId26"/>
+  </p:notesMasterIdLst>
   <p:sldIdLst>
     <p:sldId id="256" r:id="rId2"/>
-    <p:sldId id="262" r:id="rId3"/>
+    <p:sldId id="272" r:id="rId3"/>
     <p:sldId id="266" r:id="rId4"/>
     <p:sldId id="265" r:id="rId5"/>
     <p:sldId id="267" r:id="rId6"/>
@@ -19,6 +22,16 @@
     <p:sldId id="258" r:id="rId13"/>
     <p:sldId id="259" r:id="rId14"/>
     <p:sldId id="261" r:id="rId15"/>
+    <p:sldId id="274" r:id="rId16"/>
+    <p:sldId id="276" r:id="rId17"/>
+    <p:sldId id="277" r:id="rId18"/>
+    <p:sldId id="278" r:id="rId19"/>
+    <p:sldId id="279" r:id="rId20"/>
+    <p:sldId id="280" r:id="rId21"/>
+    <p:sldId id="281" r:id="rId22"/>
+    <p:sldId id="282" r:id="rId23"/>
+    <p:sldId id="283" r:id="rId24"/>
+    <p:sldId id="284" r:id="rId25"/>
   </p:sldIdLst>
   <p:sldSz cx="12192000" cy="6858000"/>
   <p:notesSz cx="6858000" cy="9144000"/>
@@ -118,11 +131,594 @@
     </a:lvl9pPr>
   </p:defaultTextStyle>
   <p:extLst>
+    <p:ext uri="{521415D9-36F7-43E2-AB2F-B90AF26B5E84}">
+      <p14:sectionLst xmlns:p14="http://schemas.microsoft.com/office/powerpoint/2010/main">
+        <p14:section name="Default Section" id="{9E461F6A-13C3-4A9E-A920-F52350377A97}">
+          <p14:sldIdLst>
+            <p14:sldId id="256"/>
+          </p14:sldIdLst>
+        </p14:section>
+        <p14:section name="leaky" id="{635CE541-3032-447A-95CE-1DB99A5F1513}">
+          <p14:sldIdLst>
+            <p14:sldId id="272"/>
+            <p14:sldId id="266"/>
+            <p14:sldId id="265"/>
+            <p14:sldId id="267"/>
+            <p14:sldId id="268"/>
+            <p14:sldId id="263"/>
+            <p14:sldId id="264"/>
+            <p14:sldId id="269"/>
+            <p14:sldId id="270"/>
+            <p14:sldId id="257"/>
+            <p14:sldId id="258"/>
+            <p14:sldId id="259"/>
+            <p14:sldId id="261"/>
+          </p14:sldIdLst>
+        </p14:section>
+        <p14:section name="semi leaky" id="{09BE45D5-7BB5-4E8C-8563-02B9D4F992C1}">
+          <p14:sldIdLst>
+            <p14:sldId id="274"/>
+            <p14:sldId id="276"/>
+            <p14:sldId id="277"/>
+            <p14:sldId id="278"/>
+            <p14:sldId id="279"/>
+            <p14:sldId id="280"/>
+            <p14:sldId id="281"/>
+            <p14:sldId id="282"/>
+            <p14:sldId id="283"/>
+            <p14:sldId id="284"/>
+          </p14:sldIdLst>
+        </p14:section>
+      </p14:sectionLst>
+    </p:ext>
     <p:ext uri="{EFAFB233-063F-42B5-8137-9DF3F51BA10A}">
       <p15:sldGuideLst xmlns:p15="http://schemas.microsoft.com/office/powerpoint/2012/main"/>
     </p:ext>
   </p:extLst>
 </p:presentation>
+</file>
+
+<file path=ppt/notesMasters/notesMaster1.xml><?xml version="1.0" encoding="utf-8"?>
+<p:notesMaster xmlns:a="http://schemas.openxmlformats.org/drawingml/2006/main" xmlns:r="http://schemas.openxmlformats.org/officeDocument/2006/relationships" xmlns:p="http://schemas.openxmlformats.org/presentationml/2006/main">
+  <p:cSld>
+    <p:bg>
+      <p:bgRef idx="1001">
+        <a:schemeClr val="bg1"/>
+      </p:bgRef>
+    </p:bg>
+    <p:spTree>
+      <p:nvGrpSpPr>
+        <p:cNvPr id="1" name=""/>
+        <p:cNvGrpSpPr/>
+        <p:nvPr/>
+      </p:nvGrpSpPr>
+      <p:grpSpPr>
+        <a:xfrm>
+          <a:off x="0" y="0"/>
+          <a:ext cx="0" cy="0"/>
+          <a:chOff x="0" y="0"/>
+          <a:chExt cx="0" cy="0"/>
+        </a:xfrm>
+      </p:grpSpPr>
+      <p:sp>
+        <p:nvSpPr>
+          <p:cNvPr id="2" name="Header Placeholder 1"/>
+          <p:cNvSpPr>
+            <a:spLocks noGrp="1"/>
+          </p:cNvSpPr>
+          <p:nvPr>
+            <p:ph type="hdr" sz="quarter"/>
+          </p:nvPr>
+        </p:nvSpPr>
+        <p:spPr>
+          <a:xfrm>
+            <a:off x="0" y="0"/>
+            <a:ext cx="2971800" cy="458788"/>
+          </a:xfrm>
+          <a:prstGeom prst="rect">
+            <a:avLst/>
+          </a:prstGeom>
+        </p:spPr>
+        <p:txBody>
+          <a:bodyPr vert="horz" lIns="91440" tIns="45720" rIns="91440" bIns="45720" rtlCol="0"/>
+          <a:lstStyle>
+            <a:lvl1pPr algn="l">
+              <a:defRPr sz="1200"/>
+            </a:lvl1pPr>
+          </a:lstStyle>
+          <a:p>
+            <a:endParaRPr lang="en-US"/>
+          </a:p>
+        </p:txBody>
+      </p:sp>
+      <p:sp>
+        <p:nvSpPr>
+          <p:cNvPr id="3" name="Date Placeholder 2"/>
+          <p:cNvSpPr>
+            <a:spLocks noGrp="1"/>
+          </p:cNvSpPr>
+          <p:nvPr>
+            <p:ph type="dt" idx="1"/>
+          </p:nvPr>
+        </p:nvSpPr>
+        <p:spPr>
+          <a:xfrm>
+            <a:off x="3884613" y="0"/>
+            <a:ext cx="2971800" cy="458788"/>
+          </a:xfrm>
+          <a:prstGeom prst="rect">
+            <a:avLst/>
+          </a:prstGeom>
+        </p:spPr>
+        <p:txBody>
+          <a:bodyPr vert="horz" lIns="91440" tIns="45720" rIns="91440" bIns="45720" rtlCol="0"/>
+          <a:lstStyle>
+            <a:lvl1pPr algn="r">
+              <a:defRPr sz="1200"/>
+            </a:lvl1pPr>
+          </a:lstStyle>
+          <a:p>
+            <a:fld id="{BD6161A1-0CF5-4DFD-9DE7-9F9B0DDDE970}" type="datetimeFigureOut">
+              <a:rPr lang="en-US" smtClean="0"/>
+              <a:t>7/29/2024</a:t>
+            </a:fld>
+            <a:endParaRPr lang="en-US"/>
+          </a:p>
+        </p:txBody>
+      </p:sp>
+      <p:sp>
+        <p:nvSpPr>
+          <p:cNvPr id="4" name="Slide Image Placeholder 3"/>
+          <p:cNvSpPr>
+            <a:spLocks noGrp="1" noRot="1" noChangeAspect="1"/>
+          </p:cNvSpPr>
+          <p:nvPr>
+            <p:ph type="sldImg" idx="2"/>
+          </p:nvPr>
+        </p:nvSpPr>
+        <p:spPr>
+          <a:xfrm>
+            <a:off x="685800" y="1143000"/>
+            <a:ext cx="5486400" cy="3086100"/>
+          </a:xfrm>
+          <a:prstGeom prst="rect">
+            <a:avLst/>
+          </a:prstGeom>
+          <a:noFill/>
+          <a:ln w="12700">
+            <a:solidFill>
+              <a:prstClr val="black"/>
+            </a:solidFill>
+          </a:ln>
+        </p:spPr>
+        <p:txBody>
+          <a:bodyPr vert="horz" lIns="91440" tIns="45720" rIns="91440" bIns="45720" rtlCol="0" anchor="ctr"/>
+          <a:lstStyle/>
+          <a:p>
+            <a:endParaRPr lang="en-US"/>
+          </a:p>
+        </p:txBody>
+      </p:sp>
+      <p:sp>
+        <p:nvSpPr>
+          <p:cNvPr id="5" name="Notes Placeholder 4"/>
+          <p:cNvSpPr>
+            <a:spLocks noGrp="1"/>
+          </p:cNvSpPr>
+          <p:nvPr>
+            <p:ph type="body" sz="quarter" idx="3"/>
+          </p:nvPr>
+        </p:nvSpPr>
+        <p:spPr>
+          <a:xfrm>
+            <a:off x="685800" y="4400550"/>
+            <a:ext cx="5486400" cy="3600450"/>
+          </a:xfrm>
+          <a:prstGeom prst="rect">
+            <a:avLst/>
+          </a:prstGeom>
+        </p:spPr>
+        <p:txBody>
+          <a:bodyPr vert="horz" lIns="91440" tIns="45720" rIns="91440" bIns="45720" rtlCol="0"/>
+          <a:lstStyle/>
+          <a:p>
+            <a:pPr lvl="0"/>
+            <a:r>
+              <a:rPr lang="en-US"/>
+              <a:t>Click to edit Master text styles</a:t>
+            </a:r>
+          </a:p>
+          <a:p>
+            <a:pPr lvl="1"/>
+            <a:r>
+              <a:rPr lang="en-US"/>
+              <a:t>Second level</a:t>
+            </a:r>
+          </a:p>
+          <a:p>
+            <a:pPr lvl="2"/>
+            <a:r>
+              <a:rPr lang="en-US"/>
+              <a:t>Third level</a:t>
+            </a:r>
+          </a:p>
+          <a:p>
+            <a:pPr lvl="3"/>
+            <a:r>
+              <a:rPr lang="en-US"/>
+              <a:t>Fourth level</a:t>
+            </a:r>
+          </a:p>
+          <a:p>
+            <a:pPr lvl="4"/>
+            <a:r>
+              <a:rPr lang="en-US"/>
+              <a:t>Fifth level</a:t>
+            </a:r>
+          </a:p>
+        </p:txBody>
+      </p:sp>
+      <p:sp>
+        <p:nvSpPr>
+          <p:cNvPr id="6" name="Footer Placeholder 5"/>
+          <p:cNvSpPr>
+            <a:spLocks noGrp="1"/>
+          </p:cNvSpPr>
+          <p:nvPr>
+            <p:ph type="ftr" sz="quarter" idx="4"/>
+          </p:nvPr>
+        </p:nvSpPr>
+        <p:spPr>
+          <a:xfrm>
+            <a:off x="0" y="8685213"/>
+            <a:ext cx="2971800" cy="458787"/>
+          </a:xfrm>
+          <a:prstGeom prst="rect">
+            <a:avLst/>
+          </a:prstGeom>
+        </p:spPr>
+        <p:txBody>
+          <a:bodyPr vert="horz" lIns="91440" tIns="45720" rIns="91440" bIns="45720" rtlCol="0" anchor="b"/>
+          <a:lstStyle>
+            <a:lvl1pPr algn="l">
+              <a:defRPr sz="1200"/>
+            </a:lvl1pPr>
+          </a:lstStyle>
+          <a:p>
+            <a:endParaRPr lang="en-US"/>
+          </a:p>
+        </p:txBody>
+      </p:sp>
+      <p:sp>
+        <p:nvSpPr>
+          <p:cNvPr id="7" name="Slide Number Placeholder 6"/>
+          <p:cNvSpPr>
+            <a:spLocks noGrp="1"/>
+          </p:cNvSpPr>
+          <p:nvPr>
+            <p:ph type="sldNum" sz="quarter" idx="5"/>
+          </p:nvPr>
+        </p:nvSpPr>
+        <p:spPr>
+          <a:xfrm>
+            <a:off x="3884613" y="8685213"/>
+            <a:ext cx="2971800" cy="458787"/>
+          </a:xfrm>
+          <a:prstGeom prst="rect">
+            <a:avLst/>
+          </a:prstGeom>
+        </p:spPr>
+        <p:txBody>
+          <a:bodyPr vert="horz" lIns="91440" tIns="45720" rIns="91440" bIns="45720" rtlCol="0" anchor="b"/>
+          <a:lstStyle>
+            <a:lvl1pPr algn="r">
+              <a:defRPr sz="1200"/>
+            </a:lvl1pPr>
+          </a:lstStyle>
+          <a:p>
+            <a:fld id="{AC598727-5AB0-486C-B70B-E65E08889CAA}" type="slidenum">
+              <a:rPr lang="en-US" smtClean="0"/>
+              <a:t>‹#›</a:t>
+            </a:fld>
+            <a:endParaRPr lang="en-US"/>
+          </a:p>
+        </p:txBody>
+      </p:sp>
+    </p:spTree>
+    <p:extLst>
+      <p:ext uri="{BB962C8B-B14F-4D97-AF65-F5344CB8AC3E}">
+        <p14:creationId xmlns:p14="http://schemas.microsoft.com/office/powerpoint/2010/main" val="857718183"/>
+      </p:ext>
+    </p:extLst>
+  </p:cSld>
+  <p:clrMap bg1="lt1" tx1="dk1" bg2="lt2" tx2="dk2" accent1="accent1" accent2="accent2" accent3="accent3" accent4="accent4" accent5="accent5" accent6="accent6" hlink="hlink" folHlink="folHlink"/>
+  <p:notesStyle>
+    <a:lvl1pPr marL="0" algn="l" defTabSz="914400" rtl="0" eaLnBrk="1" latinLnBrk="0" hangingPunct="1">
+      <a:defRPr sz="1200" kern="1200">
+        <a:solidFill>
+          <a:schemeClr val="tx1"/>
+        </a:solidFill>
+        <a:latin typeface="+mn-lt"/>
+        <a:ea typeface="+mn-ea"/>
+        <a:cs typeface="+mn-cs"/>
+      </a:defRPr>
+    </a:lvl1pPr>
+    <a:lvl2pPr marL="457200" algn="l" defTabSz="914400" rtl="0" eaLnBrk="1" latinLnBrk="0" hangingPunct="1">
+      <a:defRPr sz="1200" kern="1200">
+        <a:solidFill>
+          <a:schemeClr val="tx1"/>
+        </a:solidFill>
+        <a:latin typeface="+mn-lt"/>
+        <a:ea typeface="+mn-ea"/>
+        <a:cs typeface="+mn-cs"/>
+      </a:defRPr>
+    </a:lvl2pPr>
+    <a:lvl3pPr marL="914400" algn="l" defTabSz="914400" rtl="0" eaLnBrk="1" latinLnBrk="0" hangingPunct="1">
+      <a:defRPr sz="1200" kern="1200">
+        <a:solidFill>
+          <a:schemeClr val="tx1"/>
+        </a:solidFill>
+        <a:latin typeface="+mn-lt"/>
+        <a:ea typeface="+mn-ea"/>
+        <a:cs typeface="+mn-cs"/>
+      </a:defRPr>
+    </a:lvl3pPr>
+    <a:lvl4pPr marL="1371600" algn="l" defTabSz="914400" rtl="0" eaLnBrk="1" latinLnBrk="0" hangingPunct="1">
+      <a:defRPr sz="1200" kern="1200">
+        <a:solidFill>
+          <a:schemeClr val="tx1"/>
+        </a:solidFill>
+        <a:latin typeface="+mn-lt"/>
+        <a:ea typeface="+mn-ea"/>
+        <a:cs typeface="+mn-cs"/>
+      </a:defRPr>
+    </a:lvl4pPr>
+    <a:lvl5pPr marL="1828800" algn="l" defTabSz="914400" rtl="0" eaLnBrk="1" latinLnBrk="0" hangingPunct="1">
+      <a:defRPr sz="1200" kern="1200">
+        <a:solidFill>
+          <a:schemeClr val="tx1"/>
+        </a:solidFill>
+        <a:latin typeface="+mn-lt"/>
+        <a:ea typeface="+mn-ea"/>
+        <a:cs typeface="+mn-cs"/>
+      </a:defRPr>
+    </a:lvl5pPr>
+    <a:lvl6pPr marL="2286000" algn="l" defTabSz="914400" rtl="0" eaLnBrk="1" latinLnBrk="0" hangingPunct="1">
+      <a:defRPr sz="1200" kern="1200">
+        <a:solidFill>
+          <a:schemeClr val="tx1"/>
+        </a:solidFill>
+        <a:latin typeface="+mn-lt"/>
+        <a:ea typeface="+mn-ea"/>
+        <a:cs typeface="+mn-cs"/>
+      </a:defRPr>
+    </a:lvl6pPr>
+    <a:lvl7pPr marL="2743200" algn="l" defTabSz="914400" rtl="0" eaLnBrk="1" latinLnBrk="0" hangingPunct="1">
+      <a:defRPr sz="1200" kern="1200">
+        <a:solidFill>
+          <a:schemeClr val="tx1"/>
+        </a:solidFill>
+        <a:latin typeface="+mn-lt"/>
+        <a:ea typeface="+mn-ea"/>
+        <a:cs typeface="+mn-cs"/>
+      </a:defRPr>
+    </a:lvl7pPr>
+    <a:lvl8pPr marL="3200400" algn="l" defTabSz="914400" rtl="0" eaLnBrk="1" latinLnBrk="0" hangingPunct="1">
+      <a:defRPr sz="1200" kern="1200">
+        <a:solidFill>
+          <a:schemeClr val="tx1"/>
+        </a:solidFill>
+        <a:latin typeface="+mn-lt"/>
+        <a:ea typeface="+mn-ea"/>
+        <a:cs typeface="+mn-cs"/>
+      </a:defRPr>
+    </a:lvl8pPr>
+    <a:lvl9pPr marL="3657600" algn="l" defTabSz="914400" rtl="0" eaLnBrk="1" latinLnBrk="0" hangingPunct="1">
+      <a:defRPr sz="1200" kern="1200">
+        <a:solidFill>
+          <a:schemeClr val="tx1"/>
+        </a:solidFill>
+        <a:latin typeface="+mn-lt"/>
+        <a:ea typeface="+mn-ea"/>
+        <a:cs typeface="+mn-cs"/>
+      </a:defRPr>
+    </a:lvl9pPr>
+  </p:notesStyle>
+</p:notesMaster>
+</file>
+
+<file path=ppt/notesSlides/notesSlide1.xml><?xml version="1.0" encoding="utf-8"?>
+<p:notes xmlns:a="http://schemas.openxmlformats.org/drawingml/2006/main" xmlns:r="http://schemas.openxmlformats.org/officeDocument/2006/relationships" xmlns:p="http://schemas.openxmlformats.org/presentationml/2006/main">
+  <p:cSld>
+    <p:spTree>
+      <p:nvGrpSpPr>
+        <p:cNvPr id="1" name=""/>
+        <p:cNvGrpSpPr/>
+        <p:nvPr/>
+      </p:nvGrpSpPr>
+      <p:grpSpPr>
+        <a:xfrm>
+          <a:off x="0" y="0"/>
+          <a:ext cx="0" cy="0"/>
+          <a:chOff x="0" y="0"/>
+          <a:chExt cx="0" cy="0"/>
+        </a:xfrm>
+      </p:grpSpPr>
+      <p:sp>
+        <p:nvSpPr>
+          <p:cNvPr id="2" name="Slide Image Placeholder 1"/>
+          <p:cNvSpPr>
+            <a:spLocks noGrp="1" noRot="1" noChangeAspect="1"/>
+          </p:cNvSpPr>
+          <p:nvPr>
+            <p:ph type="sldImg"/>
+          </p:nvPr>
+        </p:nvSpPr>
+        <p:spPr/>
+      </p:sp>
+      <p:sp>
+        <p:nvSpPr>
+          <p:cNvPr id="3" name="Notes Placeholder 2"/>
+          <p:cNvSpPr>
+            <a:spLocks noGrp="1"/>
+          </p:cNvSpPr>
+          <p:nvPr>
+            <p:ph type="body" idx="1"/>
+          </p:nvPr>
+        </p:nvSpPr>
+        <p:spPr/>
+        <p:txBody>
+          <a:bodyPr/>
+          <a:lstStyle/>
+          <a:p>
+            <a:r>
+              <a:rPr lang="en-US" b="1" dirty="0"/>
+              <a:t>Log10(p-</a:t>
+            </a:r>
+            <a:r>
+              <a:rPr lang="en-US" b="1" dirty="0" err="1"/>
+              <a:t>val</a:t>
+            </a:r>
+            <a:r>
+              <a:rPr lang="en-US" b="1" dirty="0"/>
+              <a:t>)</a:t>
+            </a:r>
+          </a:p>
+        </p:txBody>
+      </p:sp>
+      <p:sp>
+        <p:nvSpPr>
+          <p:cNvPr id="4" name="Slide Number Placeholder 3"/>
+          <p:cNvSpPr>
+            <a:spLocks noGrp="1"/>
+          </p:cNvSpPr>
+          <p:nvPr>
+            <p:ph type="sldNum" sz="quarter" idx="5"/>
+          </p:nvPr>
+        </p:nvSpPr>
+        <p:spPr/>
+        <p:txBody>
+          <a:bodyPr/>
+          <a:lstStyle/>
+          <a:p>
+            <a:fld id="{AC598727-5AB0-486C-B70B-E65E08889CAA}" type="slidenum">
+              <a:rPr lang="en-US" smtClean="0"/>
+              <a:t>11</a:t>
+            </a:fld>
+            <a:endParaRPr lang="en-US"/>
+          </a:p>
+        </p:txBody>
+      </p:sp>
+    </p:spTree>
+    <p:extLst>
+      <p:ext uri="{BB962C8B-B14F-4D97-AF65-F5344CB8AC3E}">
+        <p14:creationId xmlns:p14="http://schemas.microsoft.com/office/powerpoint/2010/main" val="4101422133"/>
+      </p:ext>
+    </p:extLst>
+  </p:cSld>
+  <p:clrMapOvr>
+    <a:masterClrMapping/>
+  </p:clrMapOvr>
+</p:notes>
+</file>
+
+<file path=ppt/notesSlides/notesSlide2.xml><?xml version="1.0" encoding="utf-8"?>
+<p:notes xmlns:a="http://schemas.openxmlformats.org/drawingml/2006/main" xmlns:r="http://schemas.openxmlformats.org/officeDocument/2006/relationships" xmlns:p="http://schemas.openxmlformats.org/presentationml/2006/main">
+  <p:cSld>
+    <p:spTree>
+      <p:nvGrpSpPr>
+        <p:cNvPr id="1" name=""/>
+        <p:cNvGrpSpPr/>
+        <p:nvPr/>
+      </p:nvGrpSpPr>
+      <p:grpSpPr>
+        <a:xfrm>
+          <a:off x="0" y="0"/>
+          <a:ext cx="0" cy="0"/>
+          <a:chOff x="0" y="0"/>
+          <a:chExt cx="0" cy="0"/>
+        </a:xfrm>
+      </p:grpSpPr>
+      <p:sp>
+        <p:nvSpPr>
+          <p:cNvPr id="2" name="Slide Image Placeholder 1"/>
+          <p:cNvSpPr>
+            <a:spLocks noGrp="1" noRot="1" noChangeAspect="1"/>
+          </p:cNvSpPr>
+          <p:nvPr>
+            <p:ph type="sldImg"/>
+          </p:nvPr>
+        </p:nvSpPr>
+        <p:spPr/>
+      </p:sp>
+      <p:sp>
+        <p:nvSpPr>
+          <p:cNvPr id="3" name="Notes Placeholder 2"/>
+          <p:cNvSpPr>
+            <a:spLocks noGrp="1"/>
+          </p:cNvSpPr>
+          <p:nvPr>
+            <p:ph type="body" idx="1"/>
+          </p:nvPr>
+        </p:nvSpPr>
+        <p:spPr/>
+        <p:txBody>
+          <a:bodyPr/>
+          <a:lstStyle/>
+          <a:p>
+            <a:r>
+              <a:rPr lang="en-US" b="1" dirty="0"/>
+              <a:t>Log10(weights)</a:t>
+            </a:r>
+          </a:p>
+          <a:p>
+            <a:r>
+              <a:rPr lang="en-US" b="1" dirty="0"/>
+              <a:t>Look at higher principal components</a:t>
+            </a:r>
+          </a:p>
+          <a:p>
+            <a:r>
+              <a:rPr lang="en-US" b="1" dirty="0"/>
+              <a:t>Variance explained by each component</a:t>
+            </a:r>
+          </a:p>
+        </p:txBody>
+      </p:sp>
+      <p:sp>
+        <p:nvSpPr>
+          <p:cNvPr id="4" name="Slide Number Placeholder 3"/>
+          <p:cNvSpPr>
+            <a:spLocks noGrp="1"/>
+          </p:cNvSpPr>
+          <p:nvPr>
+            <p:ph type="sldNum" sz="quarter" idx="5"/>
+          </p:nvPr>
+        </p:nvSpPr>
+        <p:spPr/>
+        <p:txBody>
+          <a:bodyPr/>
+          <a:lstStyle/>
+          <a:p>
+            <a:fld id="{AC598727-5AB0-486C-B70B-E65E08889CAA}" type="slidenum">
+              <a:rPr lang="en-US" smtClean="0"/>
+              <a:t>14</a:t>
+            </a:fld>
+            <a:endParaRPr lang="en-US"/>
+          </a:p>
+        </p:txBody>
+      </p:sp>
+    </p:spTree>
+    <p:extLst>
+      <p:ext uri="{BB962C8B-B14F-4D97-AF65-F5344CB8AC3E}">
+        <p14:creationId xmlns:p14="http://schemas.microsoft.com/office/powerpoint/2010/main" val="1501182496"/>
+      </p:ext>
+    </p:extLst>
+  </p:cSld>
+  <p:clrMapOvr>
+    <a:masterClrMapping/>
+  </p:clrMapOvr>
+</p:notes>
 </file>
 
 <file path=ppt/slideLayouts/slideLayout1.xml><?xml version="1.0" encoding="utf-8"?>
@@ -3406,7 +4002,7 @@
 </file>
 
 <file path=ppt/slides/slide10.xml><?xml version="1.0" encoding="utf-8"?>
-<p:sld xmlns:a="http://schemas.openxmlformats.org/drawingml/2006/main" xmlns:r="http://schemas.openxmlformats.org/officeDocument/2006/relationships" xmlns:p="http://schemas.openxmlformats.org/presentationml/2006/main">
+<p:sld xmlns:a="http://schemas.openxmlformats.org/drawingml/2006/main" xmlns:r="http://schemas.openxmlformats.org/officeDocument/2006/relationships" xmlns:p="http://schemas.openxmlformats.org/presentationml/2006/main" show="0">
   <p:cSld>
     <p:spTree>
       <p:nvGrpSpPr>
@@ -3422,31 +4018,6 @@
           <a:chExt cx="0" cy="0"/>
         </a:xfrm>
       </p:grpSpPr>
-      <p:sp>
-        <p:nvSpPr>
-          <p:cNvPr id="2" name="Title 1">
-            <a:extLst>
-              <a:ext uri="{FF2B5EF4-FFF2-40B4-BE49-F238E27FC236}">
-                <a16:creationId xmlns:a16="http://schemas.microsoft.com/office/drawing/2014/main" id="{59BEEDF7-934E-5CCF-FB84-A2BAE256733A}"/>
-              </a:ext>
-            </a:extLst>
-          </p:cNvPr>
-          <p:cNvSpPr>
-            <a:spLocks noGrp="1"/>
-          </p:cNvSpPr>
-          <p:nvPr>
-            <p:ph type="title"/>
-          </p:nvPr>
-        </p:nvSpPr>
-        <p:spPr/>
-        <p:txBody>
-          <a:bodyPr/>
-          <a:lstStyle/>
-          <a:p>
-            <a:endParaRPr lang="en-US"/>
-          </a:p>
-        </p:txBody>
-      </p:sp>
       <p:pic>
         <p:nvPicPr>
           <p:cNvPr id="5" name="Content Placeholder 4" descr="A screenshot of a graph&#10;&#10;Description automatically generated">
@@ -3578,10 +4149,10 @@
       </p:sp>
       <p:pic>
         <p:nvPicPr>
-          <p:cNvPr id="5" name="Content Placeholder 4" descr="A screenshot of a graph&#10;&#10;Description automatically generated">
-            <a:extLst>
-              <a:ext uri="{FF2B5EF4-FFF2-40B4-BE49-F238E27FC236}">
-                <a16:creationId xmlns:a16="http://schemas.microsoft.com/office/drawing/2014/main" id="{521475B1-374D-C54F-26CE-479377666F27}"/>
+          <p:cNvPr id="16" name="Content Placeholder 15" descr="A graph of a graph with a graph of a graph&#10;&#10;Description automatically generated with medium confidence">
+            <a:extLst>
+              <a:ext uri="{FF2B5EF4-FFF2-40B4-BE49-F238E27FC236}">
+                <a16:creationId xmlns:a16="http://schemas.microsoft.com/office/drawing/2014/main" id="{0434E8C6-7F52-347C-A97C-32920FCC15D5}"/>
               </a:ext>
             </a:extLst>
           </p:cNvPr>
@@ -3593,7 +4164,7 @@
           </p:nvPr>
         </p:nvPicPr>
         <p:blipFill>
-          <a:blip r:embed="rId2">
+          <a:blip r:embed="rId3">
             <a:extLst>
               <a:ext uri="{28A0092B-C50C-407E-A947-70E740481C1C}">
                 <a14:useLocalDpi xmlns:a14="http://schemas.microsoft.com/office/drawing/2010/main" val="0"/>
@@ -3606,45 +4177,9 @@
         </p:blipFill>
         <p:spPr>
           <a:xfrm>
-            <a:off x="1563356" y="1825625"/>
+            <a:off x="1017925" y="1690688"/>
             <a:ext cx="9065287" cy="4351338"/>
           </a:xfrm>
-        </p:spPr>
-      </p:pic>
-      <p:pic>
-        <p:nvPicPr>
-          <p:cNvPr id="4" name="Picture 3" descr="A screenshot of a graph&#10;&#10;Description automatically generated">
-            <a:extLst>
-              <a:ext uri="{FF2B5EF4-FFF2-40B4-BE49-F238E27FC236}">
-                <a16:creationId xmlns:a16="http://schemas.microsoft.com/office/drawing/2014/main" id="{8AD3A0C2-0286-4E56-B96D-B8F29EEBE299}"/>
-              </a:ext>
-            </a:extLst>
-          </p:cNvPr>
-          <p:cNvPicPr>
-            <a:picLocks noChangeAspect="1"/>
-          </p:cNvPicPr>
-          <p:nvPr/>
-        </p:nvPicPr>
-        <p:blipFill>
-          <a:blip r:embed="rId3">
-            <a:extLst>
-              <a:ext uri="{28A0092B-C50C-407E-A947-70E740481C1C}">
-                <a14:useLocalDpi xmlns:a14="http://schemas.microsoft.com/office/drawing/2010/main" val="0"/>
-              </a:ext>
-            </a:extLst>
-          </a:blip>
-          <a:stretch>
-            <a:fillRect/>
-          </a:stretch>
-        </p:blipFill>
-        <p:spPr>
-          <a:xfrm>
-            <a:off x="1563356" y="1690688"/>
-            <a:ext cx="9525000" cy="4572000"/>
-          </a:xfrm>
-          <a:prstGeom prst="rect">
-            <a:avLst/>
-          </a:prstGeom>
         </p:spPr>
       </p:pic>
     </p:spTree>
@@ -3722,10 +4257,10 @@
       </p:sp>
       <p:pic>
         <p:nvPicPr>
-          <p:cNvPr id="5" name="Content Placeholder 4" descr="A graph with many colored dots&#10;&#10;Description automatically generated">
-            <a:extLst>
-              <a:ext uri="{FF2B5EF4-FFF2-40B4-BE49-F238E27FC236}">
-                <a16:creationId xmlns:a16="http://schemas.microsoft.com/office/drawing/2014/main" id="{53B96A23-869A-7696-ECF4-09E8F49BAB76}"/>
+          <p:cNvPr id="8" name="Content Placeholder 7" descr="A graph with many colored dots&#10;&#10;Description automatically generated">
+            <a:extLst>
+              <a:ext uri="{FF2B5EF4-FFF2-40B4-BE49-F238E27FC236}">
+                <a16:creationId xmlns:a16="http://schemas.microsoft.com/office/drawing/2014/main" id="{33B877AB-D78C-2C62-293A-0A1D8366EF16}"/>
               </a:ext>
             </a:extLst>
           </p:cNvPr>
@@ -3750,45 +4285,9 @@
         </p:blipFill>
         <p:spPr>
           <a:xfrm>
-            <a:off x="4733587" y="506165"/>
-            <a:ext cx="6191660" cy="6191660"/>
+            <a:off x="3992519" y="897146"/>
+            <a:ext cx="5343985" cy="5343985"/>
           </a:xfrm>
-        </p:spPr>
-      </p:pic>
-      <p:pic>
-        <p:nvPicPr>
-          <p:cNvPr id="4" name="Picture 3" descr="A graph with many colored dots&#10;&#10;Description automatically generated">
-            <a:extLst>
-              <a:ext uri="{FF2B5EF4-FFF2-40B4-BE49-F238E27FC236}">
-                <a16:creationId xmlns:a16="http://schemas.microsoft.com/office/drawing/2014/main" id="{F6ED8161-5E60-518F-63B9-4D61623D4DC3}"/>
-              </a:ext>
-            </a:extLst>
-          </p:cNvPr>
-          <p:cNvPicPr>
-            <a:picLocks noChangeAspect="1"/>
-          </p:cNvPicPr>
-          <p:nvPr/>
-        </p:nvPicPr>
-        <p:blipFill>
-          <a:blip r:embed="rId3">
-            <a:extLst>
-              <a:ext uri="{28A0092B-C50C-407E-A947-70E740481C1C}">
-                <a14:useLocalDpi xmlns:a14="http://schemas.microsoft.com/office/drawing/2010/main" val="0"/>
-              </a:ext>
-            </a:extLst>
-          </a:blip>
-          <a:stretch>
-            <a:fillRect/>
-          </a:stretch>
-        </p:blipFill>
-        <p:spPr>
-          <a:xfrm>
-            <a:off x="4733587" y="506165"/>
-            <a:ext cx="6191660" cy="6191660"/>
-          </a:xfrm>
-          <a:prstGeom prst="rect">
-            <a:avLst/>
-          </a:prstGeom>
         </p:spPr>
       </p:pic>
     </p:spTree>
@@ -3866,10 +4365,10 @@
       </p:sp>
       <p:pic>
         <p:nvPicPr>
-          <p:cNvPr id="11" name="Content Placeholder 10" descr="A graph with many colored dots&#10;&#10;Description automatically generated">
-            <a:extLst>
-              <a:ext uri="{FF2B5EF4-FFF2-40B4-BE49-F238E27FC236}">
-                <a16:creationId xmlns:a16="http://schemas.microsoft.com/office/drawing/2014/main" id="{10F34091-FB67-9623-20C7-EBE9ABC0A830}"/>
+          <p:cNvPr id="8" name="Content Placeholder 7" descr="A graph of a number of colorful dots&#10;&#10;Description automatically generated with medium confidence">
+            <a:extLst>
+              <a:ext uri="{FF2B5EF4-FFF2-40B4-BE49-F238E27FC236}">
+                <a16:creationId xmlns:a16="http://schemas.microsoft.com/office/drawing/2014/main" id="{1D11F897-572B-B182-36F6-3E6182D62ED2}"/>
               </a:ext>
             </a:extLst>
           </p:cNvPr>
@@ -3894,81 +4393,9 @@
         </p:blipFill>
         <p:spPr>
           <a:xfrm>
-            <a:off x="5216568" y="515580"/>
-            <a:ext cx="5977295" cy="5977295"/>
+            <a:off x="4481804" y="986590"/>
+            <a:ext cx="5158290" cy="5158290"/>
           </a:xfrm>
-        </p:spPr>
-      </p:pic>
-      <p:pic>
-        <p:nvPicPr>
-          <p:cNvPr id="4" name="Picture 3" descr="A graph of a number of colorful dots&#10;&#10;Description automatically generated with medium confidence">
-            <a:extLst>
-              <a:ext uri="{FF2B5EF4-FFF2-40B4-BE49-F238E27FC236}">
-                <a16:creationId xmlns:a16="http://schemas.microsoft.com/office/drawing/2014/main" id="{6C780F81-72DF-0602-623A-A0BD410C20BE}"/>
-              </a:ext>
-            </a:extLst>
-          </p:cNvPr>
-          <p:cNvPicPr>
-            <a:picLocks noChangeAspect="1"/>
-          </p:cNvPicPr>
-          <p:nvPr/>
-        </p:nvPicPr>
-        <p:blipFill>
-          <a:blip r:embed="rId3">
-            <a:extLst>
-              <a:ext uri="{28A0092B-C50C-407E-A947-70E740481C1C}">
-                <a14:useLocalDpi xmlns:a14="http://schemas.microsoft.com/office/drawing/2010/main" val="0"/>
-              </a:ext>
-            </a:extLst>
-          </a:blip>
-          <a:stretch>
-            <a:fillRect/>
-          </a:stretch>
-        </p:blipFill>
-        <p:spPr>
-          <a:xfrm>
-            <a:off x="5216568" y="515580"/>
-            <a:ext cx="6036318" cy="6036318"/>
-          </a:xfrm>
-          <a:prstGeom prst="rect">
-            <a:avLst/>
-          </a:prstGeom>
-        </p:spPr>
-      </p:pic>
-      <p:pic>
-        <p:nvPicPr>
-          <p:cNvPr id="6" name="Picture 5" descr="A graph of a number of colorful dots&#10;&#10;Description automatically generated with medium confidence">
-            <a:extLst>
-              <a:ext uri="{FF2B5EF4-FFF2-40B4-BE49-F238E27FC236}">
-                <a16:creationId xmlns:a16="http://schemas.microsoft.com/office/drawing/2014/main" id="{5259D6C7-07E3-CBEC-8CAF-BB75D982699A}"/>
-              </a:ext>
-            </a:extLst>
-          </p:cNvPr>
-          <p:cNvPicPr>
-            <a:picLocks noChangeAspect="1"/>
-          </p:cNvPicPr>
-          <p:nvPr/>
-        </p:nvPicPr>
-        <p:blipFill>
-          <a:blip r:embed="rId3">
-            <a:extLst>
-              <a:ext uri="{28A0092B-C50C-407E-A947-70E740481C1C}">
-                <a14:useLocalDpi xmlns:a14="http://schemas.microsoft.com/office/drawing/2010/main" val="0"/>
-              </a:ext>
-            </a:extLst>
-          </a:blip>
-          <a:stretch>
-            <a:fillRect/>
-          </a:stretch>
-        </p:blipFill>
-        <p:spPr>
-          <a:xfrm>
-            <a:off x="5216567" y="515579"/>
-            <a:ext cx="6036317" cy="6036317"/>
-          </a:xfrm>
-          <a:prstGeom prst="rect">
-            <a:avLst/>
-          </a:prstGeom>
         </p:spPr>
       </p:pic>
     </p:spTree>
@@ -4044,12 +4471,61 @@
           </a:p>
         </p:txBody>
       </p:sp>
+      <p:sp>
+        <p:nvSpPr>
+          <p:cNvPr id="3" name="TextBox 2">
+            <a:extLst>
+              <a:ext uri="{FF2B5EF4-FFF2-40B4-BE49-F238E27FC236}">
+                <a16:creationId xmlns:a16="http://schemas.microsoft.com/office/drawing/2014/main" id="{9DC1A496-AEE7-BF77-AEF5-2466F1887618}"/>
+              </a:ext>
+            </a:extLst>
+          </p:cNvPr>
+          <p:cNvSpPr txBox="1"/>
+          <p:nvPr/>
+        </p:nvSpPr>
+        <p:spPr>
+          <a:xfrm>
+            <a:off x="468374" y="1690688"/>
+            <a:ext cx="4448462" cy="646331"/>
+          </a:xfrm>
+          <a:prstGeom prst="rect">
+            <a:avLst/>
+          </a:prstGeom>
+          <a:noFill/>
+        </p:spPr>
+        <p:txBody>
+          <a:bodyPr wrap="none" rtlCol="0">
+            <a:spAutoFit/>
+          </a:bodyPr>
+          <a:lstStyle/>
+          <a:p>
+            <a:pPr marL="285750" indent="-285750">
+              <a:buFont typeface="Arial" panose="020B0604020202020204" pitchFamily="34" charset="0"/>
+              <a:buChar char="•"/>
+            </a:pPr>
+            <a:r>
+              <a:rPr lang="en-US" dirty="0"/>
+              <a:t>Green point in upper left corner is 10959</a:t>
+            </a:r>
+          </a:p>
+          <a:p>
+            <a:pPr marL="285750" indent="-285750">
+              <a:buFont typeface="Arial" panose="020B0604020202020204" pitchFamily="34" charset="0"/>
+              <a:buChar char="•"/>
+            </a:pPr>
+            <a:r>
+              <a:rPr lang="en-US" dirty="0"/>
+              <a:t>Red point in lower right corner is 11129</a:t>
+            </a:r>
+          </a:p>
+        </p:txBody>
+      </p:sp>
       <p:pic>
         <p:nvPicPr>
-          <p:cNvPr id="7" name="Content Placeholder 6" descr="A graph with numbers and symbols&#10;&#10;Description automatically generated with medium confidence">
-            <a:extLst>
-              <a:ext uri="{FF2B5EF4-FFF2-40B4-BE49-F238E27FC236}">
-                <a16:creationId xmlns:a16="http://schemas.microsoft.com/office/drawing/2014/main" id="{4981EBC7-67AC-D02A-47AF-50EB3ECCE34F}"/>
+          <p:cNvPr id="9" name="Content Placeholder 8" descr="A graph with numbers and symbols&#10;&#10;Description automatically generated">
+            <a:extLst>
+              <a:ext uri="{FF2B5EF4-FFF2-40B4-BE49-F238E27FC236}">
+                <a16:creationId xmlns:a16="http://schemas.microsoft.com/office/drawing/2014/main" id="{BC40803C-349C-F2AD-3894-CA7AB6B87E28}"/>
               </a:ext>
             </a:extLst>
           </p:cNvPr>
@@ -4061,7 +4537,7 @@
           </p:nvPr>
         </p:nvPicPr>
         <p:blipFill>
-          <a:blip r:embed="rId2">
+          <a:blip r:embed="rId3">
             <a:extLst>
               <a:ext uri="{28A0092B-C50C-407E-A947-70E740481C1C}">
                 <a14:useLocalDpi xmlns:a14="http://schemas.microsoft.com/office/drawing/2010/main" val="0"/>
@@ -4074,15 +4550,608 @@
         </p:blipFill>
         <p:spPr>
           <a:xfrm>
-            <a:off x="4909544" y="347496"/>
-            <a:ext cx="6163007" cy="6163007"/>
+            <a:off x="403450" y="2409527"/>
+            <a:ext cx="4351338" cy="4351338"/>
           </a:xfrm>
+        </p:spPr>
+      </p:pic>
+      <p:pic>
+        <p:nvPicPr>
+          <p:cNvPr id="16" name="Picture 15" descr="A graph with numbers and symbols&#10;&#10;Description automatically generated">
+            <a:extLst>
+              <a:ext uri="{FF2B5EF4-FFF2-40B4-BE49-F238E27FC236}">
+                <a16:creationId xmlns:a16="http://schemas.microsoft.com/office/drawing/2014/main" id="{4C3E8EE9-54A2-E065-DCA9-0426AC94F75F}"/>
+              </a:ext>
+            </a:extLst>
+          </p:cNvPr>
+          <p:cNvPicPr>
+            <a:picLocks noChangeAspect="1"/>
+          </p:cNvPicPr>
+          <p:nvPr/>
+        </p:nvPicPr>
+        <p:blipFill>
+          <a:blip r:embed="rId4">
+            <a:extLst>
+              <a:ext uri="{28A0092B-C50C-407E-A947-70E740481C1C}">
+                <a14:useLocalDpi xmlns:a14="http://schemas.microsoft.com/office/drawing/2010/main" val="0"/>
+              </a:ext>
+            </a:extLst>
+          </a:blip>
+          <a:stretch>
+            <a:fillRect/>
+          </a:stretch>
+        </p:blipFill>
+        <p:spPr>
+          <a:xfrm>
+            <a:off x="6037943" y="2226614"/>
+            <a:ext cx="4815114" cy="4428185"/>
+          </a:xfrm>
+          <a:prstGeom prst="rect">
+            <a:avLst/>
+          </a:prstGeom>
         </p:spPr>
       </p:pic>
     </p:spTree>
     <p:extLst>
       <p:ext uri="{BB962C8B-B14F-4D97-AF65-F5344CB8AC3E}">
         <p14:creationId xmlns:p14="http://schemas.microsoft.com/office/powerpoint/2010/main" val="444309198"/>
+      </p:ext>
+    </p:extLst>
+  </p:cSld>
+  <p:clrMapOvr>
+    <a:masterClrMapping/>
+  </p:clrMapOvr>
+</p:sld>
+</file>
+
+<file path=ppt/slides/slide15.xml><?xml version="1.0" encoding="utf-8"?>
+<p:sld xmlns:a="http://schemas.openxmlformats.org/drawingml/2006/main" xmlns:r="http://schemas.openxmlformats.org/officeDocument/2006/relationships" xmlns:p="http://schemas.openxmlformats.org/presentationml/2006/main">
+  <p:cSld>
+    <p:spTree>
+      <p:nvGrpSpPr>
+        <p:cNvPr id="1" name=""/>
+        <p:cNvGrpSpPr/>
+        <p:nvPr/>
+      </p:nvGrpSpPr>
+      <p:grpSpPr>
+        <a:xfrm>
+          <a:off x="0" y="0"/>
+          <a:ext cx="0" cy="0"/>
+          <a:chOff x="0" y="0"/>
+          <a:chExt cx="0" cy="0"/>
+        </a:xfrm>
+      </p:grpSpPr>
+      <p:sp>
+        <p:nvSpPr>
+          <p:cNvPr id="2" name="Title 1">
+            <a:extLst>
+              <a:ext uri="{FF2B5EF4-FFF2-40B4-BE49-F238E27FC236}">
+                <a16:creationId xmlns:a16="http://schemas.microsoft.com/office/drawing/2014/main" id="{3E6063B6-9D6A-1FEE-0666-F8F2225B5A00}"/>
+              </a:ext>
+            </a:extLst>
+          </p:cNvPr>
+          <p:cNvSpPr>
+            <a:spLocks noGrp="1"/>
+          </p:cNvSpPr>
+          <p:nvPr>
+            <p:ph type="title"/>
+          </p:nvPr>
+        </p:nvSpPr>
+        <p:spPr/>
+        <p:txBody>
+          <a:bodyPr/>
+          <a:lstStyle/>
+          <a:p>
+            <a:r>
+              <a:rPr lang="en-US" dirty="0"/>
+              <a:t>DEBIAS-M semi-leaky</a:t>
+            </a:r>
+          </a:p>
+        </p:txBody>
+      </p:sp>
+      <p:sp>
+        <p:nvSpPr>
+          <p:cNvPr id="3" name="Text Placeholder 2">
+            <a:extLst>
+              <a:ext uri="{FF2B5EF4-FFF2-40B4-BE49-F238E27FC236}">
+                <a16:creationId xmlns:a16="http://schemas.microsoft.com/office/drawing/2014/main" id="{3E50E587-CFAD-F69C-ABA7-C46E922D9958}"/>
+              </a:ext>
+            </a:extLst>
+          </p:cNvPr>
+          <p:cNvSpPr>
+            <a:spLocks noGrp="1"/>
+          </p:cNvSpPr>
+          <p:nvPr>
+            <p:ph type="body" idx="1"/>
+          </p:nvPr>
+        </p:nvSpPr>
+        <p:spPr/>
+        <p:txBody>
+          <a:bodyPr/>
+          <a:lstStyle/>
+          <a:p>
+            <a:endParaRPr lang="en-US"/>
+          </a:p>
+        </p:txBody>
+      </p:sp>
+    </p:spTree>
+    <p:extLst>
+      <p:ext uri="{BB962C8B-B14F-4D97-AF65-F5344CB8AC3E}">
+        <p14:creationId xmlns:p14="http://schemas.microsoft.com/office/powerpoint/2010/main" val="4073230314"/>
+      </p:ext>
+    </p:extLst>
+  </p:cSld>
+  <p:clrMapOvr>
+    <a:masterClrMapping/>
+  </p:clrMapOvr>
+</p:sld>
+</file>
+
+<file path=ppt/slides/slide16.xml><?xml version="1.0" encoding="utf-8"?>
+<p:sld xmlns:a="http://schemas.openxmlformats.org/drawingml/2006/main" xmlns:r="http://schemas.openxmlformats.org/officeDocument/2006/relationships" xmlns:p="http://schemas.openxmlformats.org/presentationml/2006/main">
+  <p:cSld>
+    <p:spTree>
+      <p:nvGrpSpPr>
+        <p:cNvPr id="1" name=""/>
+        <p:cNvGrpSpPr/>
+        <p:nvPr/>
+      </p:nvGrpSpPr>
+      <p:grpSpPr>
+        <a:xfrm>
+          <a:off x="0" y="0"/>
+          <a:ext cx="0" cy="0"/>
+          <a:chOff x="0" y="0"/>
+          <a:chExt cx="0" cy="0"/>
+        </a:xfrm>
+      </p:grpSpPr>
+      <p:sp>
+        <p:nvSpPr>
+          <p:cNvPr id="2" name="Title 1">
+            <a:extLst>
+              <a:ext uri="{FF2B5EF4-FFF2-40B4-BE49-F238E27FC236}">
+                <a16:creationId xmlns:a16="http://schemas.microsoft.com/office/drawing/2014/main" id="{DAE55E29-F812-B3B7-0B72-F378B9D4170E}"/>
+              </a:ext>
+            </a:extLst>
+          </p:cNvPr>
+          <p:cNvSpPr>
+            <a:spLocks noGrp="1"/>
+          </p:cNvSpPr>
+          <p:nvPr>
+            <p:ph type="title"/>
+          </p:nvPr>
+        </p:nvSpPr>
+        <p:spPr>
+          <a:xfrm>
+            <a:off x="187960" y="173355"/>
+            <a:ext cx="10327640" cy="675958"/>
+          </a:xfrm>
+        </p:spPr>
+        <p:txBody>
+          <a:bodyPr>
+            <a:normAutofit fontScale="90000"/>
+          </a:bodyPr>
+          <a:lstStyle/>
+          <a:p>
+            <a:r>
+              <a:rPr lang="en-US" dirty="0"/>
+              <a:t>Post-DEBIAS Histograms</a:t>
+            </a:r>
+          </a:p>
+        </p:txBody>
+      </p:sp>
+      <p:pic>
+        <p:nvPicPr>
+          <p:cNvPr id="11" name="Content Placeholder 10" descr="A graph of different sizes&#10;&#10;Description automatically generated with medium confidence">
+            <a:extLst>
+              <a:ext uri="{FF2B5EF4-FFF2-40B4-BE49-F238E27FC236}">
+                <a16:creationId xmlns:a16="http://schemas.microsoft.com/office/drawing/2014/main" id="{556587A5-6D6E-9794-BA8E-155B12B8F909}"/>
+              </a:ext>
+            </a:extLst>
+          </p:cNvPr>
+          <p:cNvPicPr>
+            <a:picLocks noGrp="1" noChangeAspect="1"/>
+          </p:cNvPicPr>
+          <p:nvPr>
+            <p:ph idx="1"/>
+          </p:nvPr>
+        </p:nvPicPr>
+        <p:blipFill>
+          <a:blip r:embed="rId2">
+            <a:extLst>
+              <a:ext uri="{28A0092B-C50C-407E-A947-70E740481C1C}">
+                <a14:useLocalDpi xmlns:a14="http://schemas.microsoft.com/office/drawing/2010/main" val="0"/>
+              </a:ext>
+            </a:extLst>
+          </a:blip>
+          <a:stretch>
+            <a:fillRect/>
+          </a:stretch>
+        </p:blipFill>
+        <p:spPr>
+          <a:xfrm>
+            <a:off x="0" y="762000"/>
+            <a:ext cx="6096000" cy="6096000"/>
+          </a:xfrm>
+        </p:spPr>
+      </p:pic>
+      <p:pic>
+        <p:nvPicPr>
+          <p:cNvPr id="13" name="Picture 12" descr="A graph of different sizes&#10;&#10;Description automatically generated with medium confidence">
+            <a:extLst>
+              <a:ext uri="{FF2B5EF4-FFF2-40B4-BE49-F238E27FC236}">
+                <a16:creationId xmlns:a16="http://schemas.microsoft.com/office/drawing/2014/main" id="{721708BB-CAA5-55C2-83B9-207B3BF4AA6A}"/>
+              </a:ext>
+            </a:extLst>
+          </p:cNvPr>
+          <p:cNvPicPr>
+            <a:picLocks noChangeAspect="1"/>
+          </p:cNvPicPr>
+          <p:nvPr/>
+        </p:nvPicPr>
+        <p:blipFill>
+          <a:blip r:embed="rId3">
+            <a:extLst>
+              <a:ext uri="{28A0092B-C50C-407E-A947-70E740481C1C}">
+                <a14:useLocalDpi xmlns:a14="http://schemas.microsoft.com/office/drawing/2010/main" val="0"/>
+              </a:ext>
+            </a:extLst>
+          </a:blip>
+          <a:stretch>
+            <a:fillRect/>
+          </a:stretch>
+        </p:blipFill>
+        <p:spPr>
+          <a:xfrm>
+            <a:off x="6096001" y="762001"/>
+            <a:ext cx="6096000" cy="6096000"/>
+          </a:xfrm>
+          <a:prstGeom prst="rect">
+            <a:avLst/>
+          </a:prstGeom>
+        </p:spPr>
+      </p:pic>
+    </p:spTree>
+    <p:extLst>
+      <p:ext uri="{BB962C8B-B14F-4D97-AF65-F5344CB8AC3E}">
+        <p14:creationId xmlns:p14="http://schemas.microsoft.com/office/powerpoint/2010/main" val="3133984326"/>
+      </p:ext>
+    </p:extLst>
+  </p:cSld>
+  <p:clrMapOvr>
+    <a:masterClrMapping/>
+  </p:clrMapOvr>
+</p:sld>
+</file>
+
+<file path=ppt/slides/slide17.xml><?xml version="1.0" encoding="utf-8"?>
+<p:sld xmlns:a="http://schemas.openxmlformats.org/drawingml/2006/main" xmlns:r="http://schemas.openxmlformats.org/officeDocument/2006/relationships" xmlns:p="http://schemas.openxmlformats.org/presentationml/2006/main">
+  <p:cSld>
+    <p:spTree>
+      <p:nvGrpSpPr>
+        <p:cNvPr id="1" name=""/>
+        <p:cNvGrpSpPr/>
+        <p:nvPr/>
+      </p:nvGrpSpPr>
+      <p:grpSpPr>
+        <a:xfrm>
+          <a:off x="0" y="0"/>
+          <a:ext cx="0" cy="0"/>
+          <a:chOff x="0" y="0"/>
+          <a:chExt cx="0" cy="0"/>
+        </a:xfrm>
+      </p:grpSpPr>
+      <p:pic>
+        <p:nvPicPr>
+          <p:cNvPr id="11" name="Content Placeholder 10" descr="A graph of different sizes&#10;&#10;Description automatically generated with medium confidence">
+            <a:extLst>
+              <a:ext uri="{FF2B5EF4-FFF2-40B4-BE49-F238E27FC236}">
+                <a16:creationId xmlns:a16="http://schemas.microsoft.com/office/drawing/2014/main" id="{125682FD-CA51-9C16-58AA-FD30B4DC4E28}"/>
+              </a:ext>
+            </a:extLst>
+          </p:cNvPr>
+          <p:cNvPicPr>
+            <a:picLocks noGrp="1" noChangeAspect="1"/>
+          </p:cNvPicPr>
+          <p:nvPr>
+            <p:ph idx="1"/>
+          </p:nvPr>
+        </p:nvPicPr>
+        <p:blipFill>
+          <a:blip r:embed="rId2">
+            <a:extLst>
+              <a:ext uri="{28A0092B-C50C-407E-A947-70E740481C1C}">
+                <a14:useLocalDpi xmlns:a14="http://schemas.microsoft.com/office/drawing/2010/main" val="0"/>
+              </a:ext>
+            </a:extLst>
+          </a:blip>
+          <a:stretch>
+            <a:fillRect/>
+          </a:stretch>
+        </p:blipFill>
+        <p:spPr>
+          <a:xfrm>
+            <a:off x="-1" y="843314"/>
+            <a:ext cx="6014685" cy="6014685"/>
+          </a:xfrm>
+        </p:spPr>
+      </p:pic>
+      <p:pic>
+        <p:nvPicPr>
+          <p:cNvPr id="13" name="Picture 12" descr="A screenshot of a graph&#10;&#10;Description automatically generated">
+            <a:extLst>
+              <a:ext uri="{FF2B5EF4-FFF2-40B4-BE49-F238E27FC236}">
+                <a16:creationId xmlns:a16="http://schemas.microsoft.com/office/drawing/2014/main" id="{7C73F0B8-8ADE-974E-94EB-253951162DA2}"/>
+              </a:ext>
+            </a:extLst>
+          </p:cNvPr>
+          <p:cNvPicPr>
+            <a:picLocks noChangeAspect="1"/>
+          </p:cNvPicPr>
+          <p:nvPr/>
+        </p:nvPicPr>
+        <p:blipFill>
+          <a:blip r:embed="rId3">
+            <a:extLst>
+              <a:ext uri="{28A0092B-C50C-407E-A947-70E740481C1C}">
+                <a14:useLocalDpi xmlns:a14="http://schemas.microsoft.com/office/drawing/2010/main" val="0"/>
+              </a:ext>
+            </a:extLst>
+          </a:blip>
+          <a:stretch>
+            <a:fillRect/>
+          </a:stretch>
+        </p:blipFill>
+        <p:spPr>
+          <a:xfrm>
+            <a:off x="6014683" y="843313"/>
+            <a:ext cx="6014685" cy="6014685"/>
+          </a:xfrm>
+          <a:prstGeom prst="rect">
+            <a:avLst/>
+          </a:prstGeom>
+        </p:spPr>
+      </p:pic>
+    </p:spTree>
+    <p:extLst>
+      <p:ext uri="{BB962C8B-B14F-4D97-AF65-F5344CB8AC3E}">
+        <p14:creationId xmlns:p14="http://schemas.microsoft.com/office/powerpoint/2010/main" val="2431904048"/>
+      </p:ext>
+    </p:extLst>
+  </p:cSld>
+  <p:clrMapOvr>
+    <a:masterClrMapping/>
+  </p:clrMapOvr>
+</p:sld>
+</file>
+
+<file path=ppt/slides/slide18.xml><?xml version="1.0" encoding="utf-8"?>
+<p:sld xmlns:a="http://schemas.openxmlformats.org/drawingml/2006/main" xmlns:r="http://schemas.openxmlformats.org/officeDocument/2006/relationships" xmlns:p="http://schemas.openxmlformats.org/presentationml/2006/main">
+  <p:cSld>
+    <p:spTree>
+      <p:nvGrpSpPr>
+        <p:cNvPr id="1" name=""/>
+        <p:cNvGrpSpPr/>
+        <p:nvPr/>
+      </p:nvGrpSpPr>
+      <p:grpSpPr>
+        <a:xfrm>
+          <a:off x="0" y="0"/>
+          <a:ext cx="0" cy="0"/>
+          <a:chOff x="0" y="0"/>
+          <a:chExt cx="0" cy="0"/>
+        </a:xfrm>
+      </p:grpSpPr>
+      <p:sp>
+        <p:nvSpPr>
+          <p:cNvPr id="2" name="Title 1">
+            <a:extLst>
+              <a:ext uri="{FF2B5EF4-FFF2-40B4-BE49-F238E27FC236}">
+                <a16:creationId xmlns:a16="http://schemas.microsoft.com/office/drawing/2014/main" id="{3BC60C7D-4EC3-3D27-2437-891FE56380CC}"/>
+              </a:ext>
+            </a:extLst>
+          </p:cNvPr>
+          <p:cNvSpPr>
+            <a:spLocks noGrp="1"/>
+          </p:cNvSpPr>
+          <p:nvPr>
+            <p:ph type="title"/>
+          </p:nvPr>
+        </p:nvSpPr>
+        <p:spPr>
+          <a:xfrm>
+            <a:off x="152400" y="111760"/>
+            <a:ext cx="10683240" cy="532448"/>
+          </a:xfrm>
+        </p:spPr>
+        <p:txBody>
+          <a:bodyPr>
+            <a:normAutofit fontScale="90000"/>
+          </a:bodyPr>
+          <a:lstStyle/>
+          <a:p>
+            <a:r>
+              <a:rPr lang="en-US" dirty="0"/>
+              <a:t>Post-DEBIAS ROC</a:t>
+            </a:r>
+          </a:p>
+        </p:txBody>
+      </p:sp>
+      <p:pic>
+        <p:nvPicPr>
+          <p:cNvPr id="11" name="Content Placeholder 10" descr="A graph of a graph&#10;&#10;Description automatically generated">
+            <a:extLst>
+              <a:ext uri="{FF2B5EF4-FFF2-40B4-BE49-F238E27FC236}">
+                <a16:creationId xmlns:a16="http://schemas.microsoft.com/office/drawing/2014/main" id="{75B8FABD-5466-C429-AC57-EA6F9BEC6BBD}"/>
+              </a:ext>
+            </a:extLst>
+          </p:cNvPr>
+          <p:cNvPicPr>
+            <a:picLocks noGrp="1" noChangeAspect="1"/>
+          </p:cNvPicPr>
+          <p:nvPr>
+            <p:ph idx="1"/>
+          </p:nvPr>
+        </p:nvPicPr>
+        <p:blipFill>
+          <a:blip r:embed="rId2">
+            <a:extLst>
+              <a:ext uri="{28A0092B-C50C-407E-A947-70E740481C1C}">
+                <a14:useLocalDpi xmlns:a14="http://schemas.microsoft.com/office/drawing/2010/main" val="0"/>
+              </a:ext>
+            </a:extLst>
+          </a:blip>
+          <a:stretch>
+            <a:fillRect/>
+          </a:stretch>
+        </p:blipFill>
+        <p:spPr>
+          <a:xfrm>
+            <a:off x="0" y="761998"/>
+            <a:ext cx="6096000" cy="6096000"/>
+          </a:xfrm>
+        </p:spPr>
+      </p:pic>
+      <p:pic>
+        <p:nvPicPr>
+          <p:cNvPr id="13" name="Picture 12" descr="A graph of training&#10;&#10;Description automatically generated">
+            <a:extLst>
+              <a:ext uri="{FF2B5EF4-FFF2-40B4-BE49-F238E27FC236}">
+                <a16:creationId xmlns:a16="http://schemas.microsoft.com/office/drawing/2014/main" id="{94D00329-5933-0C03-1F47-30BC4576850C}"/>
+              </a:ext>
+            </a:extLst>
+          </p:cNvPr>
+          <p:cNvPicPr>
+            <a:picLocks noChangeAspect="1"/>
+          </p:cNvPicPr>
+          <p:nvPr/>
+        </p:nvPicPr>
+        <p:blipFill>
+          <a:blip r:embed="rId3">
+            <a:extLst>
+              <a:ext uri="{28A0092B-C50C-407E-A947-70E740481C1C}">
+                <a14:useLocalDpi xmlns:a14="http://schemas.microsoft.com/office/drawing/2010/main" val="0"/>
+              </a:ext>
+            </a:extLst>
+          </a:blip>
+          <a:stretch>
+            <a:fillRect/>
+          </a:stretch>
+        </p:blipFill>
+        <p:spPr>
+          <a:xfrm>
+            <a:off x="6096000" y="761998"/>
+            <a:ext cx="6096000" cy="6096000"/>
+          </a:xfrm>
+          <a:prstGeom prst="rect">
+            <a:avLst/>
+          </a:prstGeom>
+        </p:spPr>
+      </p:pic>
+    </p:spTree>
+    <p:extLst>
+      <p:ext uri="{BB962C8B-B14F-4D97-AF65-F5344CB8AC3E}">
+        <p14:creationId xmlns:p14="http://schemas.microsoft.com/office/powerpoint/2010/main" val="2777746199"/>
+      </p:ext>
+    </p:extLst>
+  </p:cSld>
+  <p:clrMapOvr>
+    <a:masterClrMapping/>
+  </p:clrMapOvr>
+</p:sld>
+</file>
+
+<file path=ppt/slides/slide19.xml><?xml version="1.0" encoding="utf-8"?>
+<p:sld xmlns:a="http://schemas.openxmlformats.org/drawingml/2006/main" xmlns:r="http://schemas.openxmlformats.org/officeDocument/2006/relationships" xmlns:p="http://schemas.openxmlformats.org/presentationml/2006/main">
+  <p:cSld>
+    <p:spTree>
+      <p:nvGrpSpPr>
+        <p:cNvPr id="1" name=""/>
+        <p:cNvGrpSpPr/>
+        <p:nvPr/>
+      </p:nvGrpSpPr>
+      <p:grpSpPr>
+        <a:xfrm>
+          <a:off x="0" y="0"/>
+          <a:ext cx="0" cy="0"/>
+          <a:chOff x="0" y="0"/>
+          <a:chExt cx="0" cy="0"/>
+        </a:xfrm>
+      </p:grpSpPr>
+      <p:pic>
+        <p:nvPicPr>
+          <p:cNvPr id="11" name="Content Placeholder 10" descr="A graph of a training&#10;&#10;Description automatically generated">
+            <a:extLst>
+              <a:ext uri="{FF2B5EF4-FFF2-40B4-BE49-F238E27FC236}">
+                <a16:creationId xmlns:a16="http://schemas.microsoft.com/office/drawing/2014/main" id="{691A891F-6BDC-F936-C44E-9D50DD9D7F0D}"/>
+              </a:ext>
+            </a:extLst>
+          </p:cNvPr>
+          <p:cNvPicPr>
+            <a:picLocks noGrp="1" noChangeAspect="1"/>
+          </p:cNvPicPr>
+          <p:nvPr>
+            <p:ph idx="1"/>
+          </p:nvPr>
+        </p:nvPicPr>
+        <p:blipFill>
+          <a:blip r:embed="rId2">
+            <a:extLst>
+              <a:ext uri="{28A0092B-C50C-407E-A947-70E740481C1C}">
+                <a14:useLocalDpi xmlns:a14="http://schemas.microsoft.com/office/drawing/2010/main" val="0"/>
+              </a:ext>
+            </a:extLst>
+          </a:blip>
+          <a:stretch>
+            <a:fillRect/>
+          </a:stretch>
+        </p:blipFill>
+        <p:spPr>
+          <a:xfrm>
+            <a:off x="0" y="762000"/>
+            <a:ext cx="6096000" cy="6096000"/>
+          </a:xfrm>
+        </p:spPr>
+      </p:pic>
+      <p:pic>
+        <p:nvPicPr>
+          <p:cNvPr id="13" name="Picture 12" descr="A screenshot of a graph&#10;&#10;Description automatically generated">
+            <a:extLst>
+              <a:ext uri="{FF2B5EF4-FFF2-40B4-BE49-F238E27FC236}">
+                <a16:creationId xmlns:a16="http://schemas.microsoft.com/office/drawing/2014/main" id="{6481ECDF-B776-075D-F7A2-8DE4226A18C0}"/>
+              </a:ext>
+            </a:extLst>
+          </p:cNvPr>
+          <p:cNvPicPr>
+            <a:picLocks noChangeAspect="1"/>
+          </p:cNvPicPr>
+          <p:nvPr/>
+        </p:nvPicPr>
+        <p:blipFill>
+          <a:blip r:embed="rId3">
+            <a:extLst>
+              <a:ext uri="{28A0092B-C50C-407E-A947-70E740481C1C}">
+                <a14:useLocalDpi xmlns:a14="http://schemas.microsoft.com/office/drawing/2010/main" val="0"/>
+              </a:ext>
+            </a:extLst>
+          </a:blip>
+          <a:stretch>
+            <a:fillRect/>
+          </a:stretch>
+        </p:blipFill>
+        <p:spPr>
+          <a:xfrm>
+            <a:off x="6096000" y="678686"/>
+            <a:ext cx="6096000" cy="6096000"/>
+          </a:xfrm>
+          <a:prstGeom prst="rect">
+            <a:avLst/>
+          </a:prstGeom>
+        </p:spPr>
+      </p:pic>
+    </p:spTree>
+    <p:extLst>
+      <p:ext uri="{BB962C8B-B14F-4D97-AF65-F5344CB8AC3E}">
+        <p14:creationId xmlns:p14="http://schemas.microsoft.com/office/powerpoint/2010/main" val="767037541"/>
       </p:ext>
     </p:extLst>
   </p:cSld>
@@ -4114,15 +5183,15 @@
           <p:cNvPr id="2" name="Title 1">
             <a:extLst>
               <a:ext uri="{FF2B5EF4-FFF2-40B4-BE49-F238E27FC236}">
-                <a16:creationId xmlns:a16="http://schemas.microsoft.com/office/drawing/2014/main" id="{221EAA27-D10E-18DB-E645-0D3BADB5743B}"/>
-              </a:ext>
-            </a:extLst>
-          </p:cNvPr>
-          <p:cNvSpPr>
-            <a:spLocks noGrp="1"/>
-          </p:cNvSpPr>
-          <p:nvPr>
-            <p:ph type="title"/>
+                <a16:creationId xmlns:a16="http://schemas.microsoft.com/office/drawing/2014/main" id="{FFB10C92-9F19-96CC-8923-FC8809209B28}"/>
+              </a:ext>
+            </a:extLst>
+          </p:cNvPr>
+          <p:cNvSpPr>
+            <a:spLocks noGrp="1"/>
+          </p:cNvSpPr>
+          <p:nvPr>
+            <p:ph type="ctrTitle"/>
           </p:nvPr>
         </p:nvSpPr>
         <p:spPr/>
@@ -4132,76 +5201,477 @@
           <a:p>
             <a:r>
               <a:rPr lang="en-US" dirty="0"/>
-              <a:t>Errors</a:t>
-            </a:r>
-          </a:p>
-        </p:txBody>
-      </p:sp>
-      <p:sp>
-        <p:nvSpPr>
-          <p:cNvPr id="3" name="Content Placeholder 2">
-            <a:extLst>
-              <a:ext uri="{FF2B5EF4-FFF2-40B4-BE49-F238E27FC236}">
-                <a16:creationId xmlns:a16="http://schemas.microsoft.com/office/drawing/2014/main" id="{F94AEEED-D231-BCC1-F58E-BF83C000DCE8}"/>
-              </a:ext>
-            </a:extLst>
-          </p:cNvPr>
-          <p:cNvSpPr>
-            <a:spLocks noGrp="1"/>
-          </p:cNvSpPr>
-          <p:nvPr>
-            <p:ph idx="1"/>
-          </p:nvPr>
-        </p:nvSpPr>
-        <p:spPr/>
-        <p:txBody>
-          <a:bodyPr/>
-          <a:lstStyle/>
-          <a:p>
-            <a:r>
-              <a:rPr lang="en-US" dirty="0"/>
-              <a:t>I </a:t>
-            </a:r>
-            <a:r>
-              <a:rPr lang="en-US" dirty="0" err="1"/>
-              <a:t>realised</a:t>
-            </a:r>
-            <a:r>
-              <a:rPr lang="en-US" dirty="0"/>
-              <a:t> I filtered out the studies we were no longer using but left the taxa… this meant I had taxa with all 0s.</a:t>
-            </a:r>
-          </a:p>
-          <a:p>
-            <a:pPr lvl="1"/>
-            <a:r>
-              <a:rPr lang="en-US" dirty="0"/>
-              <a:t>This meant when scaling the data for PCA I got columns with NAs since there was no variance</a:t>
-            </a:r>
-          </a:p>
-          <a:p>
-            <a:r>
-              <a:rPr lang="en-US" dirty="0"/>
-              <a:t>I went through and fixed the data</a:t>
-            </a:r>
-          </a:p>
-          <a:p>
-            <a:pPr lvl="1"/>
-            <a:r>
-              <a:rPr lang="en-US" dirty="0"/>
-              <a:t>Celiacs </a:t>
-            </a:r>
-            <a:r>
-              <a:rPr lang="en-US"/>
-              <a:t>preformed better</a:t>
-            </a:r>
-            <a:endParaRPr lang="en-US" dirty="0"/>
+              <a:t>DEBIAS-M Leaky </a:t>
+            </a:r>
           </a:p>
         </p:txBody>
       </p:sp>
     </p:spTree>
     <p:extLst>
       <p:ext uri="{BB962C8B-B14F-4D97-AF65-F5344CB8AC3E}">
-        <p14:creationId xmlns:p14="http://schemas.microsoft.com/office/powerpoint/2010/main" val="2747959246"/>
+        <p14:creationId xmlns:p14="http://schemas.microsoft.com/office/powerpoint/2010/main" val="1884702325"/>
+      </p:ext>
+    </p:extLst>
+  </p:cSld>
+  <p:clrMapOvr>
+    <a:masterClrMapping/>
+  </p:clrMapOvr>
+</p:sld>
+</file>
+
+<file path=ppt/slides/slide20.xml><?xml version="1.0" encoding="utf-8"?>
+<p:sld xmlns:a="http://schemas.openxmlformats.org/drawingml/2006/main" xmlns:r="http://schemas.openxmlformats.org/officeDocument/2006/relationships" xmlns:p="http://schemas.openxmlformats.org/presentationml/2006/main">
+  <p:cSld>
+    <p:spTree>
+      <p:nvGrpSpPr>
+        <p:cNvPr id="1" name=""/>
+        <p:cNvGrpSpPr/>
+        <p:nvPr/>
+      </p:nvGrpSpPr>
+      <p:grpSpPr>
+        <a:xfrm>
+          <a:off x="0" y="0"/>
+          <a:ext cx="0" cy="0"/>
+          <a:chOff x="0" y="0"/>
+          <a:chExt cx="0" cy="0"/>
+        </a:xfrm>
+      </p:grpSpPr>
+      <p:sp>
+        <p:nvSpPr>
+          <p:cNvPr id="2" name="Title 1">
+            <a:extLst>
+              <a:ext uri="{FF2B5EF4-FFF2-40B4-BE49-F238E27FC236}">
+                <a16:creationId xmlns:a16="http://schemas.microsoft.com/office/drawing/2014/main" id="{82EEEBDE-4FF5-E5D4-6E6E-837103AD645E}"/>
+              </a:ext>
+            </a:extLst>
+          </p:cNvPr>
+          <p:cNvSpPr>
+            <a:spLocks noGrp="1"/>
+          </p:cNvSpPr>
+          <p:nvPr>
+            <p:ph type="title"/>
+          </p:nvPr>
+        </p:nvSpPr>
+        <p:spPr/>
+        <p:txBody>
+          <a:bodyPr/>
+          <a:lstStyle/>
+          <a:p>
+            <a:r>
+              <a:rPr lang="en-US" dirty="0"/>
+              <a:t>Box plot of AUCs and p-values</a:t>
+            </a:r>
+          </a:p>
+        </p:txBody>
+      </p:sp>
+      <p:pic>
+        <p:nvPicPr>
+          <p:cNvPr id="17" name="Content Placeholder 16" descr="A comparison of a graph&#10;&#10;Description automatically generated">
+            <a:extLst>
+              <a:ext uri="{FF2B5EF4-FFF2-40B4-BE49-F238E27FC236}">
+                <a16:creationId xmlns:a16="http://schemas.microsoft.com/office/drawing/2014/main" id="{8191F94E-E67D-AAFE-979D-1E8765CC26CD}"/>
+              </a:ext>
+            </a:extLst>
+          </p:cNvPr>
+          <p:cNvPicPr>
+            <a:picLocks noGrp="1" noChangeAspect="1"/>
+          </p:cNvPicPr>
+          <p:nvPr>
+            <p:ph idx="1"/>
+          </p:nvPr>
+        </p:nvPicPr>
+        <p:blipFill>
+          <a:blip r:embed="rId2">
+            <a:extLst>
+              <a:ext uri="{28A0092B-C50C-407E-A947-70E740481C1C}">
+                <a14:useLocalDpi xmlns:a14="http://schemas.microsoft.com/office/drawing/2010/main" val="0"/>
+              </a:ext>
+            </a:extLst>
+          </a:blip>
+          <a:stretch>
+            <a:fillRect/>
+          </a:stretch>
+        </p:blipFill>
+        <p:spPr>
+          <a:xfrm>
+            <a:off x="1563356" y="1690688"/>
+            <a:ext cx="9065287" cy="4351338"/>
+          </a:xfrm>
+        </p:spPr>
+      </p:pic>
+    </p:spTree>
+    <p:extLst>
+      <p:ext uri="{BB962C8B-B14F-4D97-AF65-F5344CB8AC3E}">
+        <p14:creationId xmlns:p14="http://schemas.microsoft.com/office/powerpoint/2010/main" val="182070388"/>
+      </p:ext>
+    </p:extLst>
+  </p:cSld>
+  <p:clrMapOvr>
+    <a:masterClrMapping/>
+  </p:clrMapOvr>
+</p:sld>
+</file>
+
+<file path=ppt/slides/slide21.xml><?xml version="1.0" encoding="utf-8"?>
+<p:sld xmlns:a="http://schemas.openxmlformats.org/drawingml/2006/main" xmlns:r="http://schemas.openxmlformats.org/officeDocument/2006/relationships" xmlns:p="http://schemas.openxmlformats.org/presentationml/2006/main">
+  <p:cSld>
+    <p:spTree>
+      <p:nvGrpSpPr>
+        <p:cNvPr id="1" name=""/>
+        <p:cNvGrpSpPr/>
+        <p:nvPr/>
+      </p:nvGrpSpPr>
+      <p:grpSpPr>
+        <a:xfrm>
+          <a:off x="0" y="0"/>
+          <a:ext cx="0" cy="0"/>
+          <a:chOff x="0" y="0"/>
+          <a:chExt cx="0" cy="0"/>
+        </a:xfrm>
+      </p:grpSpPr>
+      <p:sp>
+        <p:nvSpPr>
+          <p:cNvPr id="2" name="Title 1">
+            <a:extLst>
+              <a:ext uri="{FF2B5EF4-FFF2-40B4-BE49-F238E27FC236}">
+                <a16:creationId xmlns:a16="http://schemas.microsoft.com/office/drawing/2014/main" id="{EB94F407-E617-3AA1-0E64-E1053C34B402}"/>
+              </a:ext>
+            </a:extLst>
+          </p:cNvPr>
+          <p:cNvSpPr>
+            <a:spLocks noGrp="1"/>
+          </p:cNvSpPr>
+          <p:nvPr>
+            <p:ph type="title"/>
+          </p:nvPr>
+        </p:nvSpPr>
+        <p:spPr/>
+        <p:txBody>
+          <a:bodyPr/>
+          <a:lstStyle/>
+          <a:p>
+            <a:r>
+              <a:rPr lang="en-US" dirty="0"/>
+              <a:t>PCOAs</a:t>
+            </a:r>
+          </a:p>
+        </p:txBody>
+      </p:sp>
+      <p:pic>
+        <p:nvPicPr>
+          <p:cNvPr id="5" name="Content Placeholder 4" descr="A graph with many colored dots&#10;&#10;Description automatically generated">
+            <a:extLst>
+              <a:ext uri="{FF2B5EF4-FFF2-40B4-BE49-F238E27FC236}">
+                <a16:creationId xmlns:a16="http://schemas.microsoft.com/office/drawing/2014/main" id="{BB716BC4-778F-1932-D48C-C06A36DD18D5}"/>
+              </a:ext>
+            </a:extLst>
+          </p:cNvPr>
+          <p:cNvPicPr>
+            <a:picLocks noGrp="1" noChangeAspect="1"/>
+          </p:cNvPicPr>
+          <p:nvPr>
+            <p:ph idx="1"/>
+          </p:nvPr>
+        </p:nvPicPr>
+        <p:blipFill>
+          <a:blip r:embed="rId2">
+            <a:extLst>
+              <a:ext uri="{28A0092B-C50C-407E-A947-70E740481C1C}">
+                <a14:useLocalDpi xmlns:a14="http://schemas.microsoft.com/office/drawing/2010/main" val="0"/>
+              </a:ext>
+            </a:extLst>
+          </a:blip>
+          <a:stretch>
+            <a:fillRect/>
+          </a:stretch>
+        </p:blipFill>
+        <p:spPr>
+          <a:xfrm>
+            <a:off x="0" y="1432559"/>
+            <a:ext cx="2599267" cy="2599267"/>
+          </a:xfrm>
+        </p:spPr>
+      </p:pic>
+      <p:pic>
+        <p:nvPicPr>
+          <p:cNvPr id="7" name="Picture 6" descr="A diagram of a number of colorful dots&#10;&#10;Description automatically generated">
+            <a:extLst>
+              <a:ext uri="{FF2B5EF4-FFF2-40B4-BE49-F238E27FC236}">
+                <a16:creationId xmlns:a16="http://schemas.microsoft.com/office/drawing/2014/main" id="{4ABEEFF1-A19B-3A19-034F-1F0974189C36}"/>
+              </a:ext>
+            </a:extLst>
+          </p:cNvPr>
+          <p:cNvPicPr>
+            <a:picLocks noChangeAspect="1"/>
+          </p:cNvPicPr>
+          <p:nvPr/>
+        </p:nvPicPr>
+        <p:blipFill>
+          <a:blip r:embed="rId3">
+            <a:extLst>
+              <a:ext uri="{28A0092B-C50C-407E-A947-70E740481C1C}">
+                <a14:useLocalDpi xmlns:a14="http://schemas.microsoft.com/office/drawing/2010/main" val="0"/>
+              </a:ext>
+            </a:extLst>
+          </a:blip>
+          <a:stretch>
+            <a:fillRect/>
+          </a:stretch>
+        </p:blipFill>
+        <p:spPr>
+          <a:xfrm>
+            <a:off x="2599267" y="1432559"/>
+            <a:ext cx="2599267" cy="2599267"/>
+          </a:xfrm>
+          <a:prstGeom prst="rect">
+            <a:avLst/>
+          </a:prstGeom>
+        </p:spPr>
+      </p:pic>
+    </p:spTree>
+    <p:extLst>
+      <p:ext uri="{BB962C8B-B14F-4D97-AF65-F5344CB8AC3E}">
+        <p14:creationId xmlns:p14="http://schemas.microsoft.com/office/powerpoint/2010/main" val="1800884795"/>
+      </p:ext>
+    </p:extLst>
+  </p:cSld>
+  <p:clrMapOvr>
+    <a:masterClrMapping/>
+  </p:clrMapOvr>
+</p:sld>
+</file>
+
+<file path=ppt/slides/slide22.xml><?xml version="1.0" encoding="utf-8"?>
+<p:sld xmlns:a="http://schemas.openxmlformats.org/drawingml/2006/main" xmlns:r="http://schemas.openxmlformats.org/officeDocument/2006/relationships" xmlns:p="http://schemas.openxmlformats.org/presentationml/2006/main">
+  <p:cSld>
+    <p:spTree>
+      <p:nvGrpSpPr>
+        <p:cNvPr id="1" name=""/>
+        <p:cNvGrpSpPr/>
+        <p:nvPr/>
+      </p:nvGrpSpPr>
+      <p:grpSpPr>
+        <a:xfrm>
+          <a:off x="0" y="0"/>
+          <a:ext cx="0" cy="0"/>
+          <a:chOff x="0" y="0"/>
+          <a:chExt cx="0" cy="0"/>
+        </a:xfrm>
+      </p:grpSpPr>
+      <p:sp>
+        <p:nvSpPr>
+          <p:cNvPr id="2" name="Title 1">
+            <a:extLst>
+              <a:ext uri="{FF2B5EF4-FFF2-40B4-BE49-F238E27FC236}">
+                <a16:creationId xmlns:a16="http://schemas.microsoft.com/office/drawing/2014/main" id="{00363F1E-513D-8C09-2E33-36B09A9154C9}"/>
+              </a:ext>
+            </a:extLst>
+          </p:cNvPr>
+          <p:cNvSpPr>
+            <a:spLocks noGrp="1"/>
+          </p:cNvSpPr>
+          <p:nvPr>
+            <p:ph type="title"/>
+          </p:nvPr>
+        </p:nvSpPr>
+        <p:spPr/>
+        <p:txBody>
+          <a:bodyPr/>
+          <a:lstStyle/>
+          <a:p>
+            <a:endParaRPr lang="en-US"/>
+          </a:p>
+        </p:txBody>
+      </p:sp>
+      <p:sp>
+        <p:nvSpPr>
+          <p:cNvPr id="3" name="Content Placeholder 2">
+            <a:extLst>
+              <a:ext uri="{FF2B5EF4-FFF2-40B4-BE49-F238E27FC236}">
+                <a16:creationId xmlns:a16="http://schemas.microsoft.com/office/drawing/2014/main" id="{5C35191F-FF7D-F5CE-8194-056DD9C20A34}"/>
+              </a:ext>
+            </a:extLst>
+          </p:cNvPr>
+          <p:cNvSpPr>
+            <a:spLocks noGrp="1"/>
+          </p:cNvSpPr>
+          <p:nvPr>
+            <p:ph idx="1"/>
+          </p:nvPr>
+        </p:nvSpPr>
+        <p:spPr/>
+        <p:txBody>
+          <a:bodyPr/>
+          <a:lstStyle/>
+          <a:p>
+            <a:endParaRPr lang="en-US"/>
+          </a:p>
+        </p:txBody>
+      </p:sp>
+    </p:spTree>
+    <p:extLst>
+      <p:ext uri="{BB962C8B-B14F-4D97-AF65-F5344CB8AC3E}">
+        <p14:creationId xmlns:p14="http://schemas.microsoft.com/office/powerpoint/2010/main" val="2609316731"/>
+      </p:ext>
+    </p:extLst>
+  </p:cSld>
+  <p:clrMapOvr>
+    <a:masterClrMapping/>
+  </p:clrMapOvr>
+</p:sld>
+</file>
+
+<file path=ppt/slides/slide23.xml><?xml version="1.0" encoding="utf-8"?>
+<p:sld xmlns:a="http://schemas.openxmlformats.org/drawingml/2006/main" xmlns:r="http://schemas.openxmlformats.org/officeDocument/2006/relationships" xmlns:p="http://schemas.openxmlformats.org/presentationml/2006/main">
+  <p:cSld>
+    <p:spTree>
+      <p:nvGrpSpPr>
+        <p:cNvPr id="1" name=""/>
+        <p:cNvGrpSpPr/>
+        <p:nvPr/>
+      </p:nvGrpSpPr>
+      <p:grpSpPr>
+        <a:xfrm>
+          <a:off x="0" y="0"/>
+          <a:ext cx="0" cy="0"/>
+          <a:chOff x="0" y="0"/>
+          <a:chExt cx="0" cy="0"/>
+        </a:xfrm>
+      </p:grpSpPr>
+      <p:sp>
+        <p:nvSpPr>
+          <p:cNvPr id="2" name="Title 1">
+            <a:extLst>
+              <a:ext uri="{FF2B5EF4-FFF2-40B4-BE49-F238E27FC236}">
+                <a16:creationId xmlns:a16="http://schemas.microsoft.com/office/drawing/2014/main" id="{7CBF9B19-2BAC-0814-0131-A97C6D9C8DCC}"/>
+              </a:ext>
+            </a:extLst>
+          </p:cNvPr>
+          <p:cNvSpPr>
+            <a:spLocks noGrp="1"/>
+          </p:cNvSpPr>
+          <p:nvPr>
+            <p:ph type="title"/>
+          </p:nvPr>
+        </p:nvSpPr>
+        <p:spPr/>
+        <p:txBody>
+          <a:bodyPr/>
+          <a:lstStyle/>
+          <a:p>
+            <a:endParaRPr lang="en-US"/>
+          </a:p>
+        </p:txBody>
+      </p:sp>
+      <p:sp>
+        <p:nvSpPr>
+          <p:cNvPr id="3" name="Content Placeholder 2">
+            <a:extLst>
+              <a:ext uri="{FF2B5EF4-FFF2-40B4-BE49-F238E27FC236}">
+                <a16:creationId xmlns:a16="http://schemas.microsoft.com/office/drawing/2014/main" id="{80D292D1-BD4A-16DD-4CDE-B85094D36A70}"/>
+              </a:ext>
+            </a:extLst>
+          </p:cNvPr>
+          <p:cNvSpPr>
+            <a:spLocks noGrp="1"/>
+          </p:cNvSpPr>
+          <p:nvPr>
+            <p:ph idx="1"/>
+          </p:nvPr>
+        </p:nvSpPr>
+        <p:spPr/>
+        <p:txBody>
+          <a:bodyPr/>
+          <a:lstStyle/>
+          <a:p>
+            <a:endParaRPr lang="en-US"/>
+          </a:p>
+        </p:txBody>
+      </p:sp>
+    </p:spTree>
+    <p:extLst>
+      <p:ext uri="{BB962C8B-B14F-4D97-AF65-F5344CB8AC3E}">
+        <p14:creationId xmlns:p14="http://schemas.microsoft.com/office/powerpoint/2010/main" val="1768619740"/>
+      </p:ext>
+    </p:extLst>
+  </p:cSld>
+  <p:clrMapOvr>
+    <a:masterClrMapping/>
+  </p:clrMapOvr>
+</p:sld>
+</file>
+
+<file path=ppt/slides/slide24.xml><?xml version="1.0" encoding="utf-8"?>
+<p:sld xmlns:a="http://schemas.openxmlformats.org/drawingml/2006/main" xmlns:r="http://schemas.openxmlformats.org/officeDocument/2006/relationships" xmlns:p="http://schemas.openxmlformats.org/presentationml/2006/main">
+  <p:cSld>
+    <p:spTree>
+      <p:nvGrpSpPr>
+        <p:cNvPr id="1" name=""/>
+        <p:cNvGrpSpPr/>
+        <p:nvPr/>
+      </p:nvGrpSpPr>
+      <p:grpSpPr>
+        <a:xfrm>
+          <a:off x="0" y="0"/>
+          <a:ext cx="0" cy="0"/>
+          <a:chOff x="0" y="0"/>
+          <a:chExt cx="0" cy="0"/>
+        </a:xfrm>
+      </p:grpSpPr>
+      <p:sp>
+        <p:nvSpPr>
+          <p:cNvPr id="2" name="Title 1">
+            <a:extLst>
+              <a:ext uri="{FF2B5EF4-FFF2-40B4-BE49-F238E27FC236}">
+                <a16:creationId xmlns:a16="http://schemas.microsoft.com/office/drawing/2014/main" id="{59FD67BB-F28D-D7BF-9A99-B9632B60F537}"/>
+              </a:ext>
+            </a:extLst>
+          </p:cNvPr>
+          <p:cNvSpPr>
+            <a:spLocks noGrp="1"/>
+          </p:cNvSpPr>
+          <p:nvPr>
+            <p:ph type="title"/>
+          </p:nvPr>
+        </p:nvSpPr>
+        <p:spPr/>
+        <p:txBody>
+          <a:bodyPr/>
+          <a:lstStyle/>
+          <a:p>
+            <a:endParaRPr lang="en-US"/>
+          </a:p>
+        </p:txBody>
+      </p:sp>
+      <p:sp>
+        <p:nvSpPr>
+          <p:cNvPr id="3" name="Content Placeholder 2">
+            <a:extLst>
+              <a:ext uri="{FF2B5EF4-FFF2-40B4-BE49-F238E27FC236}">
+                <a16:creationId xmlns:a16="http://schemas.microsoft.com/office/drawing/2014/main" id="{CE518E7E-9694-6C03-FB34-F4E3F7D99ABE}"/>
+              </a:ext>
+            </a:extLst>
+          </p:cNvPr>
+          <p:cNvSpPr>
+            <a:spLocks noGrp="1"/>
+          </p:cNvSpPr>
+          <p:nvPr>
+            <p:ph idx="1"/>
+          </p:nvPr>
+        </p:nvSpPr>
+        <p:spPr/>
+        <p:txBody>
+          <a:bodyPr/>
+          <a:lstStyle/>
+          <a:p>
+            <a:endParaRPr lang="en-US"/>
+          </a:p>
+        </p:txBody>
+      </p:sp>
+    </p:spTree>
+    <p:extLst>
+      <p:ext uri="{BB962C8B-B14F-4D97-AF65-F5344CB8AC3E}">
+        <p14:creationId xmlns:p14="http://schemas.microsoft.com/office/powerpoint/2010/main" val="1480245022"/>
       </p:ext>
     </p:extLst>
   </p:cSld>
@@ -4212,7 +5682,7 @@
 </file>
 
 <file path=ppt/slides/slide3.xml><?xml version="1.0" encoding="utf-8"?>
-<p:sld xmlns:a="http://schemas.openxmlformats.org/drawingml/2006/main" xmlns:r="http://schemas.openxmlformats.org/officeDocument/2006/relationships" xmlns:p="http://schemas.openxmlformats.org/presentationml/2006/main">
+<p:sld xmlns:a="http://schemas.openxmlformats.org/drawingml/2006/main" xmlns:r="http://schemas.openxmlformats.org/officeDocument/2006/relationships" xmlns:p="http://schemas.openxmlformats.org/presentationml/2006/main" show="0">
   <p:cSld>
     <p:spTree>
       <p:nvGrpSpPr>
@@ -4348,7 +5818,7 @@
 </file>
 
 <file path=ppt/slides/slide4.xml><?xml version="1.0" encoding="utf-8"?>
-<p:sld xmlns:a="http://schemas.openxmlformats.org/drawingml/2006/main" xmlns:r="http://schemas.openxmlformats.org/officeDocument/2006/relationships" xmlns:p="http://schemas.openxmlformats.org/presentationml/2006/main">
+<p:sld xmlns:a="http://schemas.openxmlformats.org/drawingml/2006/main" xmlns:r="http://schemas.openxmlformats.org/officeDocument/2006/relationships" xmlns:p="http://schemas.openxmlformats.org/presentationml/2006/main" show="0">
   <p:cSld>
     <p:spTree>
       <p:nvGrpSpPr>
@@ -4449,7 +5919,7 @@
 </file>
 
 <file path=ppt/slides/slide5.xml><?xml version="1.0" encoding="utf-8"?>
-<p:sld xmlns:a="http://schemas.openxmlformats.org/drawingml/2006/main" xmlns:r="http://schemas.openxmlformats.org/officeDocument/2006/relationships" xmlns:p="http://schemas.openxmlformats.org/presentationml/2006/main">
+<p:sld xmlns:a="http://schemas.openxmlformats.org/drawingml/2006/main" xmlns:r="http://schemas.openxmlformats.org/officeDocument/2006/relationships" xmlns:p="http://schemas.openxmlformats.org/presentationml/2006/main" show="0">
   <p:cSld>
     <p:spTree>
       <p:nvGrpSpPr>
@@ -4585,7 +6055,7 @@
 </file>
 
 <file path=ppt/slides/slide6.xml><?xml version="1.0" encoding="utf-8"?>
-<p:sld xmlns:a="http://schemas.openxmlformats.org/drawingml/2006/main" xmlns:r="http://schemas.openxmlformats.org/officeDocument/2006/relationships" xmlns:p="http://schemas.openxmlformats.org/presentationml/2006/main">
+<p:sld xmlns:a="http://schemas.openxmlformats.org/drawingml/2006/main" xmlns:r="http://schemas.openxmlformats.org/officeDocument/2006/relationships" xmlns:p="http://schemas.openxmlformats.org/presentationml/2006/main" show="0">
   <p:cSld>
     <p:spTree>
       <p:nvGrpSpPr>
@@ -4711,7 +6181,7 @@
 </file>
 
 <file path=ppt/slides/slide7.xml><?xml version="1.0" encoding="utf-8"?>
-<p:sld xmlns:a="http://schemas.openxmlformats.org/drawingml/2006/main" xmlns:r="http://schemas.openxmlformats.org/officeDocument/2006/relationships" xmlns:p="http://schemas.openxmlformats.org/presentationml/2006/main">
+<p:sld xmlns:a="http://schemas.openxmlformats.org/drawingml/2006/main" xmlns:r="http://schemas.openxmlformats.org/officeDocument/2006/relationships" xmlns:p="http://schemas.openxmlformats.org/presentationml/2006/main" show="0">
   <p:cSld>
     <p:spTree>
       <p:nvGrpSpPr>
@@ -4847,7 +6317,7 @@
 </file>
 
 <file path=ppt/slides/slide8.xml><?xml version="1.0" encoding="utf-8"?>
-<p:sld xmlns:a="http://schemas.openxmlformats.org/drawingml/2006/main" xmlns:r="http://schemas.openxmlformats.org/officeDocument/2006/relationships" xmlns:p="http://schemas.openxmlformats.org/presentationml/2006/main">
+<p:sld xmlns:a="http://schemas.openxmlformats.org/drawingml/2006/main" xmlns:r="http://schemas.openxmlformats.org/officeDocument/2006/relationships" xmlns:p="http://schemas.openxmlformats.org/presentationml/2006/main" show="0">
   <p:cSld>
     <p:spTree>
       <p:nvGrpSpPr>
@@ -4973,7 +6443,7 @@
 </file>
 
 <file path=ppt/slides/slide9.xml><?xml version="1.0" encoding="utf-8"?>
-<p:sld xmlns:a="http://schemas.openxmlformats.org/drawingml/2006/main" xmlns:r="http://schemas.openxmlformats.org/officeDocument/2006/relationships" xmlns:p="http://schemas.openxmlformats.org/presentationml/2006/main">
+<p:sld xmlns:a="http://schemas.openxmlformats.org/drawingml/2006/main" xmlns:r="http://schemas.openxmlformats.org/officeDocument/2006/relationships" xmlns:p="http://schemas.openxmlformats.org/presentationml/2006/main" show="0">
   <p:cSld>
     <p:spTree>
       <p:nvGrpSpPr>
@@ -5421,4 +6891,319 @@
     </a:ext>
   </a:extLst>
 </a:theme>
+</file>
+
+<file path=ppt/theme/theme2.xml><?xml version="1.0" encoding="utf-8"?>
+<a:theme xmlns:a="http://schemas.openxmlformats.org/drawingml/2006/main" name="Office Theme">
+  <a:themeElements>
+    <a:clrScheme name="Office">
+      <a:dk1>
+        <a:sysClr val="windowText" lastClr="000000"/>
+      </a:dk1>
+      <a:lt1>
+        <a:sysClr val="window" lastClr="FFFFFF"/>
+      </a:lt1>
+      <a:dk2>
+        <a:srgbClr val="0E2841"/>
+      </a:dk2>
+      <a:lt2>
+        <a:srgbClr val="E8E8E8"/>
+      </a:lt2>
+      <a:accent1>
+        <a:srgbClr val="156082"/>
+      </a:accent1>
+      <a:accent2>
+        <a:srgbClr val="E97132"/>
+      </a:accent2>
+      <a:accent3>
+        <a:srgbClr val="196B24"/>
+      </a:accent3>
+      <a:accent4>
+        <a:srgbClr val="0F9ED5"/>
+      </a:accent4>
+      <a:accent5>
+        <a:srgbClr val="A02B93"/>
+      </a:accent5>
+      <a:accent6>
+        <a:srgbClr val="4EA72E"/>
+      </a:accent6>
+      <a:hlink>
+        <a:srgbClr val="467886"/>
+      </a:hlink>
+      <a:folHlink>
+        <a:srgbClr val="96607D"/>
+      </a:folHlink>
+    </a:clrScheme>
+    <a:fontScheme name="Office">
+      <a:majorFont>
+        <a:latin typeface="Aptos Display" panose="02110004020202020204"/>
+        <a:ea typeface=""/>
+        <a:cs typeface=""/>
+        <a:font script="Jpan" typeface="游ゴシック Light"/>
+        <a:font script="Hang" typeface="맑은 고딕"/>
+        <a:font script="Hans" typeface="等线 Light"/>
+        <a:font script="Hant" typeface="新細明體"/>
+        <a:font script="Arab" typeface="Times New Roman"/>
+        <a:font script="Hebr" typeface="Times New Roman"/>
+        <a:font script="Thai" typeface="Angsana New"/>
+        <a:font script="Ethi" typeface="Nyala"/>
+        <a:font script="Beng" typeface="Vrinda"/>
+        <a:font script="Gujr" typeface="Shruti"/>
+        <a:font script="Khmr" typeface="MoolBoran"/>
+        <a:font script="Knda" typeface="Tunga"/>
+        <a:font script="Guru" typeface="Raavi"/>
+        <a:font script="Cans" typeface="Euphemia"/>
+        <a:font script="Cher" typeface="Plantagenet Cherokee"/>
+        <a:font script="Yiii" typeface="Microsoft Yi Baiti"/>
+        <a:font script="Tibt" typeface="Microsoft Himalaya"/>
+        <a:font script="Thaa" typeface="MV Boli"/>
+        <a:font script="Deva" typeface="Mangal"/>
+        <a:font script="Telu" typeface="Gautami"/>
+        <a:font script="Taml" typeface="Latha"/>
+        <a:font script="Syrc" typeface="Estrangelo Edessa"/>
+        <a:font script="Orya" typeface="Kalinga"/>
+        <a:font script="Mlym" typeface="Kartika"/>
+        <a:font script="Laoo" typeface="DokChampa"/>
+        <a:font script="Sinh" typeface="Iskoola Pota"/>
+        <a:font script="Mong" typeface="Mongolian Baiti"/>
+        <a:font script="Viet" typeface="Times New Roman"/>
+        <a:font script="Uigh" typeface="Microsoft Uighur"/>
+        <a:font script="Geor" typeface="Sylfaen"/>
+        <a:font script="Armn" typeface="Arial"/>
+        <a:font script="Bugi" typeface="Leelawadee UI"/>
+        <a:font script="Bopo" typeface="Microsoft JhengHei"/>
+        <a:font script="Java" typeface="Javanese Text"/>
+        <a:font script="Lisu" typeface="Segoe UI"/>
+        <a:font script="Mymr" typeface="Myanmar Text"/>
+        <a:font script="Nkoo" typeface="Ebrima"/>
+        <a:font script="Olck" typeface="Nirmala UI"/>
+        <a:font script="Osma" typeface="Ebrima"/>
+        <a:font script="Phag" typeface="Phagspa"/>
+        <a:font script="Syrn" typeface="Estrangelo Edessa"/>
+        <a:font script="Syrj" typeface="Estrangelo Edessa"/>
+        <a:font script="Syre" typeface="Estrangelo Edessa"/>
+        <a:font script="Sora" typeface="Nirmala UI"/>
+        <a:font script="Tale" typeface="Microsoft Tai Le"/>
+        <a:font script="Talu" typeface="Microsoft New Tai Lue"/>
+        <a:font script="Tfng" typeface="Ebrima"/>
+      </a:majorFont>
+      <a:minorFont>
+        <a:latin typeface="Aptos" panose="02110004020202020204"/>
+        <a:ea typeface=""/>
+        <a:cs typeface=""/>
+        <a:font script="Jpan" typeface="游ゴシック"/>
+        <a:font script="Hang" typeface="맑은 고딕"/>
+        <a:font script="Hans" typeface="等线"/>
+        <a:font script="Hant" typeface="新細明體"/>
+        <a:font script="Arab" typeface="Arial"/>
+        <a:font script="Hebr" typeface="Arial"/>
+        <a:font script="Thai" typeface="Cordia New"/>
+        <a:font script="Ethi" typeface="Nyala"/>
+        <a:font script="Beng" typeface="Vrinda"/>
+        <a:font script="Gujr" typeface="Shruti"/>
+        <a:font script="Khmr" typeface="DaunPenh"/>
+        <a:font script="Knda" typeface="Tunga"/>
+        <a:font script="Guru" typeface="Raavi"/>
+        <a:font script="Cans" typeface="Euphemia"/>
+        <a:font script="Cher" typeface="Plantagenet Cherokee"/>
+        <a:font script="Yiii" typeface="Microsoft Yi Baiti"/>
+        <a:font script="Tibt" typeface="Microsoft Himalaya"/>
+        <a:font script="Thaa" typeface="MV Boli"/>
+        <a:font script="Deva" typeface="Mangal"/>
+        <a:font script="Telu" typeface="Gautami"/>
+        <a:font script="Taml" typeface="Latha"/>
+        <a:font script="Syrc" typeface="Estrangelo Edessa"/>
+        <a:font script="Orya" typeface="Kalinga"/>
+        <a:font script="Mlym" typeface="Kartika"/>
+        <a:font script="Laoo" typeface="DokChampa"/>
+        <a:font script="Sinh" typeface="Iskoola Pota"/>
+        <a:font script="Mong" typeface="Mongolian Baiti"/>
+        <a:font script="Viet" typeface="Arial"/>
+        <a:font script="Uigh" typeface="Microsoft Uighur"/>
+        <a:font script="Geor" typeface="Sylfaen"/>
+        <a:font script="Armn" typeface="Arial"/>
+        <a:font script="Bugi" typeface="Leelawadee UI"/>
+        <a:font script="Bopo" typeface="Microsoft JhengHei"/>
+        <a:font script="Java" typeface="Javanese Text"/>
+        <a:font script="Lisu" typeface="Segoe UI"/>
+        <a:font script="Mymr" typeface="Myanmar Text"/>
+        <a:font script="Nkoo" typeface="Ebrima"/>
+        <a:font script="Olck" typeface="Nirmala UI"/>
+        <a:font script="Osma" typeface="Ebrima"/>
+        <a:font script="Phag" typeface="Phagspa"/>
+        <a:font script="Syrn" typeface="Estrangelo Edessa"/>
+        <a:font script="Syrj" typeface="Estrangelo Edessa"/>
+        <a:font script="Syre" typeface="Estrangelo Edessa"/>
+        <a:font script="Sora" typeface="Nirmala UI"/>
+        <a:font script="Tale" typeface="Microsoft Tai Le"/>
+        <a:font script="Talu" typeface="Microsoft New Tai Lue"/>
+        <a:font script="Tfng" typeface="Ebrima"/>
+      </a:minorFont>
+    </a:fontScheme>
+    <a:fmtScheme name="Office">
+      <a:fillStyleLst>
+        <a:solidFill>
+          <a:schemeClr val="phClr"/>
+        </a:solidFill>
+        <a:gradFill rotWithShape="1">
+          <a:gsLst>
+            <a:gs pos="0">
+              <a:schemeClr val="phClr">
+                <a:lumMod val="110000"/>
+                <a:satMod val="105000"/>
+                <a:tint val="67000"/>
+              </a:schemeClr>
+            </a:gs>
+            <a:gs pos="50000">
+              <a:schemeClr val="phClr">
+                <a:lumMod val="105000"/>
+                <a:satMod val="103000"/>
+                <a:tint val="73000"/>
+              </a:schemeClr>
+            </a:gs>
+            <a:gs pos="100000">
+              <a:schemeClr val="phClr">
+                <a:lumMod val="105000"/>
+                <a:satMod val="109000"/>
+                <a:tint val="81000"/>
+              </a:schemeClr>
+            </a:gs>
+          </a:gsLst>
+          <a:lin ang="5400000" scaled="0"/>
+        </a:gradFill>
+        <a:gradFill rotWithShape="1">
+          <a:gsLst>
+            <a:gs pos="0">
+              <a:schemeClr val="phClr">
+                <a:satMod val="103000"/>
+                <a:lumMod val="102000"/>
+                <a:tint val="94000"/>
+              </a:schemeClr>
+            </a:gs>
+            <a:gs pos="50000">
+              <a:schemeClr val="phClr">
+                <a:satMod val="110000"/>
+                <a:lumMod val="100000"/>
+                <a:shade val="100000"/>
+              </a:schemeClr>
+            </a:gs>
+            <a:gs pos="100000">
+              <a:schemeClr val="phClr">
+                <a:lumMod val="99000"/>
+                <a:satMod val="120000"/>
+                <a:shade val="78000"/>
+              </a:schemeClr>
+            </a:gs>
+          </a:gsLst>
+          <a:lin ang="5400000" scaled="0"/>
+        </a:gradFill>
+      </a:fillStyleLst>
+      <a:lnStyleLst>
+        <a:ln w="12700" cap="flat" cmpd="sng" algn="ctr">
+          <a:solidFill>
+            <a:schemeClr val="phClr"/>
+          </a:solidFill>
+          <a:prstDash val="solid"/>
+          <a:miter lim="800000"/>
+        </a:ln>
+        <a:ln w="19050" cap="flat" cmpd="sng" algn="ctr">
+          <a:solidFill>
+            <a:schemeClr val="phClr"/>
+          </a:solidFill>
+          <a:prstDash val="solid"/>
+          <a:miter lim="800000"/>
+        </a:ln>
+        <a:ln w="25400" cap="flat" cmpd="sng" algn="ctr">
+          <a:solidFill>
+            <a:schemeClr val="phClr"/>
+          </a:solidFill>
+          <a:prstDash val="solid"/>
+          <a:miter lim="800000"/>
+        </a:ln>
+      </a:lnStyleLst>
+      <a:effectStyleLst>
+        <a:effectStyle>
+          <a:effectLst/>
+        </a:effectStyle>
+        <a:effectStyle>
+          <a:effectLst/>
+        </a:effectStyle>
+        <a:effectStyle>
+          <a:effectLst>
+            <a:outerShdw blurRad="57150" dist="19050" dir="5400000" algn="ctr" rotWithShape="0">
+              <a:srgbClr val="000000">
+                <a:alpha val="63000"/>
+              </a:srgbClr>
+            </a:outerShdw>
+          </a:effectLst>
+        </a:effectStyle>
+      </a:effectStyleLst>
+      <a:bgFillStyleLst>
+        <a:solidFill>
+          <a:schemeClr val="phClr"/>
+        </a:solidFill>
+        <a:solidFill>
+          <a:schemeClr val="phClr">
+            <a:tint val="95000"/>
+            <a:satMod val="170000"/>
+          </a:schemeClr>
+        </a:solidFill>
+        <a:gradFill rotWithShape="1">
+          <a:gsLst>
+            <a:gs pos="0">
+              <a:schemeClr val="phClr">
+                <a:tint val="93000"/>
+                <a:satMod val="150000"/>
+                <a:shade val="98000"/>
+                <a:lumMod val="102000"/>
+              </a:schemeClr>
+            </a:gs>
+            <a:gs pos="50000">
+              <a:schemeClr val="phClr">
+                <a:tint val="98000"/>
+                <a:satMod val="130000"/>
+                <a:shade val="90000"/>
+                <a:lumMod val="103000"/>
+              </a:schemeClr>
+            </a:gs>
+            <a:gs pos="100000">
+              <a:schemeClr val="phClr">
+                <a:shade val="63000"/>
+                <a:satMod val="120000"/>
+              </a:schemeClr>
+            </a:gs>
+          </a:gsLst>
+          <a:lin ang="5400000" scaled="0"/>
+        </a:gradFill>
+      </a:bgFillStyleLst>
+    </a:fmtScheme>
+  </a:themeElements>
+  <a:objectDefaults>
+    <a:lnDef>
+      <a:spPr/>
+      <a:bodyPr/>
+      <a:lstStyle/>
+      <a:style>
+        <a:lnRef idx="2">
+          <a:schemeClr val="accent1"/>
+        </a:lnRef>
+        <a:fillRef idx="0">
+          <a:schemeClr val="accent1"/>
+        </a:fillRef>
+        <a:effectRef idx="1">
+          <a:schemeClr val="accent1"/>
+        </a:effectRef>
+        <a:fontRef idx="minor">
+          <a:schemeClr val="tx1"/>
+        </a:fontRef>
+      </a:style>
+    </a:lnDef>
+  </a:objectDefaults>
+  <a:extraClrSchemeLst/>
+  <a:extLst>
+    <a:ext uri="{05A4C25C-085E-4340-85A3-A5531E510DB2}">
+      <thm15:themeFamily xmlns:thm15="http://schemas.microsoft.com/office/thememl/2012/main" name="Office Theme" id="{2E142A2C-CD16-42D6-873A-C26D2A0506FA}" vid="{1BDDFF52-6CD6-40A5-AB3C-68EB2F1E4D0A}"/>
+    </a:ext>
+  </a:extLst>
+</a:theme>
 </file>
</xml_diff>